<commit_message>
modifes the ebdt 2019 slightly
</commit_message>
<xml_diff>
--- a/slides/edbt-2019/edbt-2019.pptx
+++ b/slides/edbt-2019/edbt-2019.pptx
@@ -2954,7 +2954,7 @@
             </a:pPr>
             <a:r>
               <a:rPr lang="en-US" dirty="0"/>
-              <a:t>Up until now, we were under the assumption that we can store all the raw and preprocessed data in our storage unit.</a:t>
+              <a:t>Up until now, we were under the assumption that we can store all the raw and preprocessed data in our storage unit, whether it is the memory or disk.</a:t>
             </a:r>
           </a:p>
           <a:p>
@@ -3032,7 +3032,7 @@
           <a:p>
             <a:r>
               <a:rPr lang="en-US" dirty="0"/>
-              <a:t>So, we remove older preprocessed features when the storage limit is reached</a:t>
+              <a:t>In our prototype, we’re caching the preprocessed features in memory, so when the memory becomes full, we start removing older preprocessed features from the memory.</a:t>
             </a:r>
           </a:p>
           <a:p>

</xml_diff>

<commit_message>
final version of edbt
</commit_message>
<xml_diff>
--- a/slides/edbt-2019/edbt-2019.pptx
+++ b/slides/edbt-2019/edbt-2019.pptx
@@ -230,7 +230,7 @@
           <a:p>
             <a:fld id="{58FCFAAB-590E-6D47-91E1-3683E175C756}" type="datetimeFigureOut">
               <a:rPr lang="en-US" smtClean="0"/>
-              <a:t>3/27/19</a:t>
+              <a:t>3/28/19</a:t>
             </a:fld>
             <a:endParaRPr lang="en-US"/>
           </a:p>
@@ -624,7 +624,10 @@
               <a:tabLst/>
               <a:defRPr/>
             </a:pPr>
-            <a:endParaRPr lang="en-US" dirty="0"/>
+            <a:r>
+              <a:rPr lang="en-US" dirty="0"/>
+              <a:t>1:00</a:t>
+            </a:r>
           </a:p>
         </p:txBody>
       </p:sp>
@@ -714,7 +717,7 @@
             </a:pPr>
             <a:r>
               <a:rPr lang="en-US" dirty="0"/>
-              <a:t>8:0</a:t>
+              <a:t>8:20 – 10:20</a:t>
             </a:r>
           </a:p>
           <a:p>
@@ -836,13 +839,6 @@
               <a:rPr lang="en-US" dirty="0"/>
               <a:t>These computed statistics along with the cached features are reused later during the proactive training to update the model</a:t>
             </a:r>
-          </a:p>
-          <a:p>
-            <a:pPr marL="628650" lvl="1" indent="-171450">
-              <a:buFontTx/>
-              <a:buChar char="-"/>
-            </a:pPr>
-            <a:endParaRPr lang="en-US" dirty="0"/>
           </a:p>
           <a:p>
             <a:pPr marL="628650" lvl="1" indent="-171450">
@@ -942,7 +938,7 @@
           <a:p>
             <a:r>
               <a:rPr lang="en-US" dirty="0"/>
-              <a:t>10:00</a:t>
+              <a:t>10:20 – 11:30</a:t>
             </a:r>
           </a:p>
           <a:p>
@@ -956,13 +952,63 @@
             </a:r>
           </a:p>
           <a:p>
+            <a:pPr marL="171450" lvl="0" indent="-171450">
+              <a:buFont typeface="Arial" panose="020B0604020202020204" pitchFamily="34" charset="0"/>
+              <a:buChar char="•"/>
+            </a:pPr>
+            <a:r>
+              <a:rPr lang="en-US" dirty="0"/>
+              <a:t>How much space do we have </a:t>
+            </a:r>
+          </a:p>
+          <a:p>
+            <a:pPr marL="171450" lvl="0" indent="-171450">
+              <a:buFont typeface="Arial" panose="020B0604020202020204" pitchFamily="34" charset="0"/>
+              <a:buChar char="•"/>
+            </a:pPr>
+            <a:r>
+              <a:rPr lang="en-US" dirty="0"/>
+              <a:t>Fast access -&gt; Memory becomes full fast</a:t>
+            </a:r>
+          </a:p>
+          <a:p>
+            <a:pPr marL="171450" lvl="0" indent="-171450">
+              <a:buFont typeface="Arial" panose="020B0604020202020204" pitchFamily="34" charset="0"/>
+              <a:buChar char="•"/>
+            </a:pPr>
+            <a:r>
+              <a:rPr lang="en-US" dirty="0"/>
+              <a:t>Remove older features and only keep the reference</a:t>
+            </a:r>
+          </a:p>
+          <a:p>
+            <a:pPr marL="171450" lvl="0" indent="-171450">
+              <a:buFont typeface="Arial" panose="020B0604020202020204" pitchFamily="34" charset="0"/>
+              <a:buChar char="•"/>
+            </a:pPr>
+            <a:r>
+              <a:rPr lang="en-US" dirty="0"/>
+              <a:t>This indicates that some of feature chunks are no longer available for training</a:t>
+            </a:r>
+          </a:p>
+          <a:p>
+            <a:pPr marL="171450" lvl="0" indent="-171450">
+              <a:buFont typeface="Arial" panose="020B0604020202020204" pitchFamily="34" charset="0"/>
+              <a:buChar char="•"/>
+            </a:pPr>
+            <a:r>
+              <a:rPr lang="en-US" dirty="0"/>
+              <a:t>In the next slides </a:t>
+            </a:r>
+          </a:p>
+          <a:p>
             <a:pPr marL="628650" lvl="1" indent="-171450">
               <a:buFont typeface="Arial" panose="020B0604020202020204" pitchFamily="34" charset="0"/>
               <a:buChar char="•"/>
             </a:pPr>
             <a:r>
               <a:rPr lang="en-US" dirty="0"/>
-              <a:t>High space do we have for storing the cached features </a:t>
+              <a:t>Implications for the proactive training phase</a:t>
             </a:r>
           </a:p>
           <a:p>
@@ -972,67 +1018,7 @@
             </a:pPr>
             <a:r>
               <a:rPr lang="en-US" dirty="0"/>
-              <a:t>Specially since we want to access them quickly, we are storing them in memory and when talking about large datasets and fast data streams</a:t>
-            </a:r>
-          </a:p>
-          <a:p>
-            <a:pPr marL="628650" lvl="1" indent="-171450">
-              <a:buFont typeface="Arial" panose="020B0604020202020204" pitchFamily="34" charset="0"/>
-              <a:buChar char="•"/>
-            </a:pPr>
-            <a:r>
-              <a:rPr lang="en-US" dirty="0"/>
-              <a:t>This cache layer may quickly become full</a:t>
-            </a:r>
-          </a:p>
-          <a:p>
-            <a:pPr marL="628650" lvl="1" indent="-171450">
-              <a:buFont typeface="Arial" panose="020B0604020202020204" pitchFamily="34" charset="0"/>
-              <a:buChar char="•"/>
-            </a:pPr>
-            <a:r>
-              <a:rPr lang="en-US" dirty="0"/>
-              <a:t>Therefore, we start removing older cached features to make room for new ones</a:t>
-            </a:r>
-          </a:p>
-          <a:p>
-            <a:pPr marL="628650" lvl="1" indent="-171450">
-              <a:buFont typeface="Arial" panose="020B0604020202020204" pitchFamily="34" charset="0"/>
-              <a:buChar char="•"/>
-            </a:pPr>
-            <a:r>
-              <a:rPr lang="en-US" dirty="0"/>
-              <a:t>And only keep the reference to the originating chunk</a:t>
-            </a:r>
-          </a:p>
-          <a:p>
-            <a:pPr marL="628650" lvl="1" indent="-171450">
-              <a:buFont typeface="Arial" panose="020B0604020202020204" pitchFamily="34" charset="0"/>
-              <a:buChar char="•"/>
-            </a:pPr>
-            <a:r>
-              <a:rPr lang="en-US" dirty="0"/>
-              <a:t>This indicates that some of feature chunks are no longer available for training</a:t>
-            </a:r>
-          </a:p>
-          <a:p>
-            <a:pPr marL="628650" lvl="1" indent="-171450">
-              <a:buFont typeface="Arial" panose="020B0604020202020204" pitchFamily="34" charset="0"/>
-              <a:buChar char="•"/>
-            </a:pPr>
-            <a:r>
-              <a:rPr lang="en-US" dirty="0"/>
-              <a:t>In the next few slides I will discuss how to alleviate this problem</a:t>
-            </a:r>
-          </a:p>
-          <a:p>
-            <a:pPr marL="171450" lvl="0" indent="-171450">
-              <a:buFont typeface="Arial" panose="020B0604020202020204" pitchFamily="34" charset="0"/>
-              <a:buChar char="•"/>
-            </a:pPr>
-            <a:r>
-              <a:rPr lang="en-US" dirty="0"/>
-              <a:t>But before that let me discuss the second phase of the deployment platform the proactive training</a:t>
+              <a:t>How to Alleviate the problem</a:t>
             </a:r>
           </a:p>
         </p:txBody>
@@ -1117,13 +1103,36 @@
           <a:bodyPr/>
           <a:lstStyle/>
           <a:p>
+            <a:pPr marL="171450" marR="0" lvl="0" indent="-171450" algn="l" defTabSz="914400" rtl="0" eaLnBrk="1" fontAlgn="auto" latinLnBrk="0" hangingPunct="1">
+              <a:lnSpc>
+                <a:spcPct val="100000"/>
+              </a:lnSpc>
+              <a:spcBef>
+                <a:spcPts val="0"/>
+              </a:spcBef>
+              <a:spcAft>
+                <a:spcPts val="0"/>
+              </a:spcAft>
+              <a:buClrTx/>
+              <a:buSzTx/>
+              <a:buFontTx/>
+              <a:buChar char="-"/>
+              <a:tabLst/>
+              <a:defRPr/>
+            </a:pPr>
+            <a:r>
+              <a:rPr lang="en-US" dirty="0"/>
+              <a:t>11:30 - 14:20</a:t>
+            </a:r>
+          </a:p>
+          <a:p>
             <a:pPr marL="171450" indent="-171450">
               <a:buFontTx/>
               <a:buChar char="-"/>
             </a:pPr>
             <a:r>
               <a:rPr lang="en-US" dirty="0"/>
-              <a:t>11:00</a:t>
+              <a:t>SGD Models</a:t>
             </a:r>
           </a:p>
           <a:p>
@@ -1133,7 +1142,7 @@
             </a:pPr>
             <a:r>
               <a:rPr lang="en-US" dirty="0"/>
-              <a:t>Models that can be trained using SGD</a:t>
+              <a:t>Mini Batch SGD</a:t>
             </a:r>
           </a:p>
           <a:p>
@@ -1143,7 +1152,7 @@
             </a:pPr>
             <a:r>
               <a:rPr lang="en-US" dirty="0"/>
-              <a:t>One common approach for training models on large datasets are the mini batch SGD</a:t>
+              <a:t>Iterative process -&gt; Sample -&gt; compute gradients -&gt; Update Model</a:t>
             </a:r>
           </a:p>
           <a:p>
@@ -1153,7 +1162,47 @@
             </a:pPr>
             <a:r>
               <a:rPr lang="en-US" dirty="0"/>
-              <a:t>The original algorithm is a iterative process, where in each iteration</a:t>
+              <a:t>Proactive phase, each component performs some part of the algorithm</a:t>
+            </a:r>
+          </a:p>
+          <a:p>
+            <a:pPr marL="171450" lvl="0" indent="-171450">
+              <a:buFontTx/>
+              <a:buChar char="-"/>
+            </a:pPr>
+            <a:r>
+              <a:rPr lang="en-US" dirty="0"/>
+              <a:t>The historical dataset is the training dataset</a:t>
+            </a:r>
+          </a:p>
+          <a:p>
+            <a:pPr marL="171450" lvl="0" indent="-171450">
+              <a:buFontTx/>
+              <a:buChar char="-"/>
+            </a:pPr>
+            <a:r>
+              <a:rPr lang="en-US" dirty="0"/>
+              <a:t>Sampler samples and materialize</a:t>
+            </a:r>
+          </a:p>
+          <a:p>
+            <a:pPr marL="171450" lvl="0" indent="-171450">
+              <a:buFontTx/>
+              <a:buChar char="-"/>
+            </a:pPr>
+            <a:r>
+              <a:rPr lang="en-US" dirty="0"/>
+              <a:t>Updater computes gradients and learning rate and updates the model</a:t>
+            </a:r>
+          </a:p>
+          <a:p>
+            <a:pPr marL="171450" lvl="0" indent="-171450">
+              <a:buFontTx/>
+              <a:buChar char="-"/>
+            </a:pPr>
+            <a:r>
+              <a:rPr lang="en-US" dirty="0"/>
+              <a:t>Scheduler decides when to execute next iteration</a:t>
             </a:r>
           </a:p>
           <a:p>
@@ -1163,7 +1212,7 @@
             </a:pPr>
             <a:r>
               <a:rPr lang="en-US" dirty="0"/>
-              <a:t>Data is sampled</a:t>
+              <a:t>Dynamic </a:t>
             </a:r>
           </a:p>
           <a:p>
@@ -1173,7 +1222,7 @@
             </a:pPr>
             <a:r>
               <a:rPr lang="en-US" dirty="0"/>
-              <a:t>The gradient of the loss function is computed</a:t>
+              <a:t>Static</a:t>
             </a:r>
           </a:p>
           <a:p>
@@ -1181,80 +1230,7 @@
               <a:buFontTx/>
               <a:buChar char="-"/>
             </a:pPr>
-            <a:r>
-              <a:rPr lang="en-US" dirty="0"/>
-              <a:t>The model is updated</a:t>
-            </a:r>
-          </a:p>
-          <a:p>
-            <a:pPr marL="171450" indent="-171450">
-              <a:buFontTx/>
-              <a:buChar char="-"/>
-            </a:pPr>
-            <a:r>
-              <a:rPr lang="en-US" dirty="0"/>
-              <a:t>In proactive training, each step of the platform performs parts of the algorithm</a:t>
-            </a:r>
-          </a:p>
-          <a:p>
-            <a:pPr marL="628650" lvl="1" indent="-171450">
-              <a:buFontTx/>
-              <a:buChar char="-"/>
-            </a:pPr>
-            <a:r>
-              <a:rPr lang="en-US" dirty="0"/>
-              <a:t>The historical dataset is the training dataset</a:t>
-            </a:r>
-          </a:p>
-          <a:p>
-            <a:pPr marL="628650" lvl="1" indent="-171450">
-              <a:buFontTx/>
-              <a:buChar char="-"/>
-            </a:pPr>
-            <a:r>
-              <a:rPr lang="en-US" dirty="0"/>
-              <a:t>The sampling operation is performed the sampling step of the platform, If however any of the removed cached features are sample we must materialize and recreate them first</a:t>
-            </a:r>
-          </a:p>
-          <a:p>
-            <a:pPr marL="628650" lvl="1" indent="-171450">
-              <a:buFontTx/>
-              <a:buChar char="-"/>
-            </a:pPr>
-            <a:r>
-              <a:rPr lang="en-US" dirty="0"/>
-              <a:t>The gradients are inside the update state</a:t>
-            </a:r>
-          </a:p>
-          <a:p>
-            <a:pPr marL="628650" lvl="1" indent="-171450">
-              <a:buFontTx/>
-              <a:buChar char="-"/>
-            </a:pPr>
-            <a:r>
-              <a:rPr lang="en-US" dirty="0"/>
-              <a:t>And the model is update using these gradients</a:t>
-            </a:r>
-          </a:p>
-          <a:p>
-            <a:pPr marL="628650" lvl="1" indent="-171450">
-              <a:buFontTx/>
-              <a:buChar char="-"/>
-            </a:pPr>
-            <a:r>
-              <a:rPr lang="en-US" dirty="0"/>
-              <a:t>Finally instead of the iterative process, we have scheduler that triggers execution of the steps over and over either dynamically or based on user defined intervals</a:t>
-            </a:r>
-          </a:p>
-          <a:p>
-            <a:pPr marL="171450" lvl="0" indent="-171450">
-              <a:buFontTx/>
-              <a:buChar char="-"/>
-            </a:pPr>
-            <a:r>
-              <a:rPr lang="en-US" dirty="0"/>
-              <a:t>2:40</a:t>
-            </a:r>
+            <a:endParaRPr lang="en-US" dirty="0"/>
           </a:p>
         </p:txBody>
       </p:sp>
@@ -1357,7 +1333,7 @@
             </a:pPr>
             <a:r>
               <a:rPr lang="en-US" dirty="0"/>
-              <a:t>13:30</a:t>
+              <a:t>14:20 – 15:30</a:t>
             </a:r>
           </a:p>
           <a:p>
@@ -1380,7 +1356,7 @@
             </a:pPr>
             <a:r>
               <a:rPr lang="en-US" dirty="0"/>
-              <a:t>The materialization step looks into the result of the sampling</a:t>
+              <a:t>Older data removed</a:t>
             </a:r>
           </a:p>
           <a:p>
@@ -1403,99 +1379,7 @@
             </a:pPr>
             <a:r>
               <a:rPr lang="en-US" dirty="0"/>
-              <a:t>When any of the sampled data they no longer have the </a:t>
-            </a:r>
-          </a:p>
-          <a:p>
-            <a:pPr marL="628650" marR="0" lvl="1" indent="-171450" algn="l" defTabSz="914400" rtl="0" eaLnBrk="1" fontAlgn="auto" latinLnBrk="0" hangingPunct="1">
-              <a:lnSpc>
-                <a:spcPct val="100000"/>
-              </a:lnSpc>
-              <a:spcBef>
-                <a:spcPts val="0"/>
-              </a:spcBef>
-              <a:spcAft>
-                <a:spcPts val="0"/>
-              </a:spcAft>
-              <a:buClrTx/>
-              <a:buSzTx/>
-              <a:buFontTx/>
-              <a:buChar char="-"/>
-              <a:tabLst/>
-              <a:defRPr/>
-            </a:pPr>
-            <a:r>
-              <a:rPr lang="en-US" dirty="0"/>
-              <a:t>It uses the deployed pipeline to transform these data and essentially materializing the features from the raw data chunks</a:t>
-            </a:r>
-          </a:p>
-          <a:p>
-            <a:pPr marL="628650" marR="0" lvl="1" indent="-171450" algn="l" defTabSz="914400" rtl="0" eaLnBrk="1" fontAlgn="auto" latinLnBrk="0" hangingPunct="1">
-              <a:lnSpc>
-                <a:spcPct val="100000"/>
-              </a:lnSpc>
-              <a:spcBef>
-                <a:spcPts val="0"/>
-              </a:spcBef>
-              <a:spcAft>
-                <a:spcPts val="0"/>
-              </a:spcAft>
-              <a:buClrTx/>
-              <a:buSzTx/>
-              <a:buFontTx/>
-              <a:buChar char="-"/>
-              <a:tabLst/>
-              <a:defRPr/>
-            </a:pPr>
-            <a:r>
-              <a:rPr lang="en-US" dirty="0"/>
-              <a:t>Platforms keeps statistics</a:t>
-            </a:r>
-          </a:p>
-          <a:p>
-            <a:pPr marL="628650" marR="0" lvl="1" indent="-171450" algn="l" defTabSz="914400" rtl="0" eaLnBrk="1" fontAlgn="auto" latinLnBrk="0" hangingPunct="1">
-              <a:lnSpc>
-                <a:spcPct val="100000"/>
-              </a:lnSpc>
-              <a:spcBef>
-                <a:spcPts val="0"/>
-              </a:spcBef>
-              <a:spcAft>
-                <a:spcPts val="0"/>
-              </a:spcAft>
-              <a:buClrTx/>
-              <a:buSzTx/>
-              <a:buFontTx/>
-              <a:buChar char="-"/>
-              <a:tabLst/>
-              <a:defRPr/>
-            </a:pPr>
-            <a:r>
-              <a:rPr lang="en-US" dirty="0"/>
-              <a:t>During materialization we do not need recompute these statistics over the data</a:t>
-            </a:r>
-          </a:p>
-          <a:p>
-            <a:pPr marL="628650" marR="0" lvl="1" indent="-171450" algn="l" defTabSz="914400" rtl="0" eaLnBrk="1" fontAlgn="auto" latinLnBrk="0" hangingPunct="1">
-              <a:lnSpc>
-                <a:spcPct val="100000"/>
-              </a:lnSpc>
-              <a:spcBef>
-                <a:spcPts val="0"/>
-              </a:spcBef>
-              <a:spcAft>
-                <a:spcPts val="0"/>
-              </a:spcAft>
-              <a:buClrTx/>
-              <a:buSzTx/>
-              <a:buFontTx/>
-              <a:buChar char="-"/>
-              <a:tabLst/>
-              <a:defRPr/>
-            </a:pPr>
-            <a:r>
-              <a:rPr lang="en-US" dirty="0"/>
-              <a:t>This improves the data processing by around 20%</a:t>
+              <a:t>Based on the result of the sampling</a:t>
             </a:r>
           </a:p>
           <a:p>
@@ -1518,7 +1402,7 @@
             </a:pPr>
             <a:r>
               <a:rPr lang="en-US" dirty="0"/>
-              <a:t>With all the features computed we can now proceed to the training step of the platform</a:t>
+              <a:t>Materialize</a:t>
             </a:r>
           </a:p>
           <a:p>
@@ -1541,7 +1425,76 @@
             </a:pPr>
             <a:r>
               <a:rPr lang="en-US" dirty="0"/>
-              <a:t>1:20</a:t>
+              <a:t>We use deployed pipeline to recreate the features</a:t>
+            </a:r>
+          </a:p>
+          <a:p>
+            <a:pPr marL="171450" marR="0" lvl="0" indent="-171450" algn="l" defTabSz="914400" rtl="0" eaLnBrk="1" fontAlgn="auto" latinLnBrk="0" hangingPunct="1">
+              <a:lnSpc>
+                <a:spcPct val="100000"/>
+              </a:lnSpc>
+              <a:spcBef>
+                <a:spcPts val="0"/>
+              </a:spcBef>
+              <a:spcAft>
+                <a:spcPts val="0"/>
+              </a:spcAft>
+              <a:buClrTx/>
+              <a:buSzTx/>
+              <a:buFontTx/>
+              <a:buChar char="-"/>
+              <a:tabLst/>
+              <a:defRPr/>
+            </a:pPr>
+            <a:r>
+              <a:rPr lang="en-US" dirty="0"/>
+              <a:t>Since statistics are already computed, </a:t>
+            </a:r>
+          </a:p>
+          <a:p>
+            <a:pPr marL="171450" marR="0" lvl="0" indent="-171450" algn="l" defTabSz="914400" rtl="0" eaLnBrk="1" fontAlgn="auto" latinLnBrk="0" hangingPunct="1">
+              <a:lnSpc>
+                <a:spcPct val="100000"/>
+              </a:lnSpc>
+              <a:spcBef>
+                <a:spcPts val="0"/>
+              </a:spcBef>
+              <a:spcAft>
+                <a:spcPts val="0"/>
+              </a:spcAft>
+              <a:buClrTx/>
+              <a:buSzTx/>
+              <a:buFontTx/>
+              <a:buChar char="-"/>
+              <a:tabLst/>
+              <a:defRPr/>
+            </a:pPr>
+            <a:r>
+              <a:rPr lang="en-US" dirty="0"/>
+              <a:t>The process can be done much faster</a:t>
+            </a:r>
+          </a:p>
+          <a:p>
+            <a:pPr marL="171450" marR="0" lvl="0" indent="-171450" algn="l" defTabSz="914400" rtl="0" eaLnBrk="1" fontAlgn="auto" latinLnBrk="0" hangingPunct="1">
+              <a:lnSpc>
+                <a:spcPct val="100000"/>
+              </a:lnSpc>
+              <a:spcBef>
+                <a:spcPts val="0"/>
+              </a:spcBef>
+              <a:spcAft>
+                <a:spcPts val="0"/>
+              </a:spcAft>
+              <a:buClrTx/>
+              <a:buSzTx/>
+              <a:buFontTx/>
+              <a:buChar char="-"/>
+              <a:tabLst/>
+              <a:defRPr/>
+            </a:pPr>
+            <a:r>
+              <a:rPr lang="en-US" dirty="0"/>
+              <a:t>15:30</a:t>
             </a:r>
           </a:p>
         </p:txBody>
@@ -1645,36 +1598,7 @@
             </a:pPr>
             <a:r>
               <a:rPr lang="en-US" dirty="0"/>
-              <a:t>14:50</a:t>
-            </a:r>
-          </a:p>
-          <a:p>
-            <a:pPr marL="0" marR="0" lvl="0" indent="0" algn="l" defTabSz="914400" rtl="0" eaLnBrk="1" fontAlgn="auto" latinLnBrk="0" hangingPunct="1">
-              <a:lnSpc>
-                <a:spcPct val="100000"/>
-              </a:lnSpc>
-              <a:spcBef>
-                <a:spcPts val="0"/>
-              </a:spcBef>
-              <a:spcAft>
-                <a:spcPts val="0"/>
-              </a:spcAft>
-              <a:buClrTx/>
-              <a:buSzTx/>
-              <a:buFontTx/>
-              <a:buNone/>
-              <a:tabLst/>
-              <a:defRPr/>
-            </a:pPr>
-            <a:r>
-              <a:rPr lang="en-US" dirty="0"/>
-              <a:t>We use Apache Spark to implement the prototype</a:t>
-            </a:r>
-          </a:p>
-          <a:p>
-            <a:r>
-              <a:rPr lang="en-US" dirty="0"/>
-              <a:t>- Deploy two pipeline</a:t>
+              <a:t>- 15:30 – 17:40</a:t>
             </a:r>
           </a:p>
           <a:p>
@@ -1684,31 +1608,27 @@
             </a:pPr>
             <a:r>
               <a:rPr lang="en-US" dirty="0"/>
-              <a:t>URL</a:t>
-            </a:r>
-          </a:p>
-          <a:p>
-            <a:pPr marL="628650" lvl="1" indent="-171450">
+              <a:t>Deploy two pipeline</a:t>
+            </a:r>
+          </a:p>
+          <a:p>
+            <a:pPr marL="171450" indent="-171450">
               <a:buFontTx/>
               <a:buChar char="-"/>
             </a:pPr>
             <a:r>
               <a:rPr lang="en-US" dirty="0"/>
-              <a:t>4 preprocessing and SVM model</a:t>
-            </a:r>
-          </a:p>
-          <a:p>
-            <a:pPr marL="628650" lvl="1" indent="-171450">
+              <a:t>URL 4 preprocessing and SVM model</a:t>
+            </a:r>
+          </a:p>
+          <a:p>
+            <a:pPr marL="171450" indent="-171450">
               <a:buFontTx/>
               <a:buChar char="-"/>
             </a:pPr>
             <a:r>
-              <a:rPr lang="en-US" dirty="0"/>
-              <a:t>Process the </a:t>
-            </a:r>
-            <a:r>
               <a:rPr lang="en-US" dirty="0" err="1"/>
-              <a:t>url</a:t>
+              <a:t>Url</a:t>
             </a:r>
             <a:r>
               <a:rPr lang="en-US" dirty="0"/>
@@ -1738,27 +1658,7 @@
             </a:pPr>
             <a:r>
               <a:rPr lang="en-US" dirty="0"/>
-              <a:t>Taxi</a:t>
-            </a:r>
-          </a:p>
-          <a:p>
-            <a:pPr marL="628650" lvl="1" indent="-171450">
-              <a:buFontTx/>
-              <a:buChar char="-"/>
-            </a:pPr>
-            <a:r>
-              <a:rPr lang="en-US" dirty="0"/>
-              <a:t>4 preprocessing step and a linear regression model</a:t>
-            </a:r>
-          </a:p>
-          <a:p>
-            <a:pPr marL="628650" lvl="1" indent="-171450">
-              <a:buFontTx/>
-              <a:buChar char="-"/>
-            </a:pPr>
-            <a:r>
-              <a:rPr lang="en-US" dirty="0"/>
-              <a:t>New York taxi dataset, we use data from Jan 15 to Jun 16, the task here it to estimate the travel time of each taxi ride</a:t>
+              <a:t>Taxi 4 preprocessing step and a linear regression model</a:t>
             </a:r>
           </a:p>
           <a:p>
@@ -1768,27 +1668,7 @@
             </a:pPr>
             <a:r>
               <a:rPr lang="en-US" dirty="0"/>
-              <a:t>For both pipelines, we first trained them on an initial training data, </a:t>
-            </a:r>
-          </a:p>
-          <a:p>
-            <a:pPr marL="628650" lvl="1" indent="-171450">
-              <a:buFontTx/>
-              <a:buChar char="-"/>
-            </a:pPr>
-            <a:r>
-              <a:rPr lang="en-US" dirty="0"/>
-              <a:t>URL Day 0</a:t>
-            </a:r>
-          </a:p>
-          <a:p>
-            <a:pPr marL="628650" lvl="1" indent="-171450">
-              <a:buFontTx/>
-              <a:buChar char="-"/>
-            </a:pPr>
-            <a:r>
-              <a:rPr lang="en-US" dirty="0"/>
-              <a:t>Taxi Jan 15</a:t>
+              <a:t>New York taxi dataset, we use data from Jan 15 to Jun 16, </a:t>
             </a:r>
           </a:p>
           <a:p>
@@ -1798,7 +1678,7 @@
             </a:pPr>
             <a:r>
               <a:rPr lang="en-US" dirty="0"/>
-              <a:t>The we deploy the pipelines and use the remining data to perform inference and further training</a:t>
+              <a:t>For both pipelines, we first trained them on an initial training data, </a:t>
             </a:r>
           </a:p>
           <a:p>
@@ -1808,7 +1688,7 @@
             </a:pPr>
             <a:r>
               <a:rPr lang="en-US" dirty="0"/>
-              <a:t>I will show the result of our evaluations for the URL pipeline</a:t>
+              <a:t>The we deploy the pipelines and use the remining data to perform inference and further training</a:t>
             </a:r>
           </a:p>
           <a:p>
@@ -1818,7 +1698,17 @@
             </a:pPr>
             <a:r>
               <a:rPr lang="en-US" dirty="0"/>
-              <a:t>1:50</a:t>
+              <a:t>I will show the result of our evaluations for the URL pipeline</a:t>
+            </a:r>
+          </a:p>
+          <a:p>
+            <a:pPr marL="171450" lvl="0" indent="-171450">
+              <a:buFontTx/>
+              <a:buChar char="-"/>
+            </a:pPr>
+            <a:r>
+              <a:rPr lang="en-US" dirty="0"/>
+              <a:t>17:40</a:t>
             </a:r>
           </a:p>
         </p:txBody>
@@ -1909,7 +1799,30 @@
             </a:pPr>
             <a:r>
               <a:rPr lang="en-US" b="0" noProof="0" dirty="0"/>
-              <a:t>16:40</a:t>
+              <a:t>17:40 – 19:20</a:t>
+            </a:r>
+          </a:p>
+          <a:p>
+            <a:pPr marL="171450" marR="0" lvl="0" indent="-171450" algn="l" defTabSz="914400" rtl="0" eaLnBrk="1" fontAlgn="auto" latinLnBrk="0" hangingPunct="1">
+              <a:lnSpc>
+                <a:spcPct val="100000"/>
+              </a:lnSpc>
+              <a:spcBef>
+                <a:spcPts val="0"/>
+              </a:spcBef>
+              <a:spcAft>
+                <a:spcPts val="0"/>
+              </a:spcAft>
+              <a:buClrTx/>
+              <a:buSzTx/>
+              <a:buFontTx/>
+              <a:buChar char="-"/>
+              <a:tabLst/>
+              <a:defRPr/>
+            </a:pPr>
+            <a:r>
+              <a:rPr lang="en-US" b="0" noProof="0" dirty="0"/>
+              <a:t>Question: Can we do as good as retraining, when incomes to prediction accuracy or not</a:t>
             </a:r>
           </a:p>
           <a:p>
@@ -1919,7 +1832,7 @@
             </a:pPr>
             <a:r>
               <a:rPr lang="en-US" b="0" noProof="0" dirty="0"/>
-              <a:t>The first part of the question we </a:t>
+              <a:t>Accuracy after Deployment</a:t>
             </a:r>
           </a:p>
           <a:p>
@@ -1929,7 +1842,7 @@
             </a:pPr>
             <a:r>
               <a:rPr lang="en-US" b="0" noProof="0" dirty="0"/>
-              <a:t>To evaluate the accuracy of the model after deployment, we report the misclassification rate of the SVM model of the URL pipeline</a:t>
+              <a:t>Misclassification Error Rate of SVM </a:t>
             </a:r>
           </a:p>
           <a:p>
@@ -1939,7 +1852,7 @@
             </a:pPr>
             <a:r>
               <a:rPr lang="en-US" b="0" noProof="0" dirty="0"/>
-              <a:t>Y axis Cumulative Prequential</a:t>
+              <a:t>Proactive (our method)</a:t>
             </a:r>
           </a:p>
           <a:p>
@@ -1949,7 +1862,7 @@
             </a:pPr>
             <a:r>
               <a:rPr lang="en-US" b="0" noProof="0" dirty="0"/>
-              <a:t>X axis shows the time, as we said we use the data from day 1 until day 120 for inference and further training.</a:t>
+              <a:t>Retraining (every day 10s we initiate a full retraining)</a:t>
             </a:r>
           </a:p>
           <a:p>
@@ -1959,7 +1872,7 @@
             </a:pPr>
             <a:r>
               <a:rPr lang="en-US" b="0" noProof="0" dirty="0"/>
-              <a:t>Proactive (our method)</a:t>
+              <a:t>Online, where each data item is only used once for training</a:t>
             </a:r>
           </a:p>
           <a:p>
@@ -1969,7 +1882,7 @@
             </a:pPr>
             <a:r>
               <a:rPr lang="en-US" b="0" noProof="0" dirty="0"/>
-              <a:t>Retraining (every day 10s we initiate a full retraining)</a:t>
+              <a:t>Both are better than online, which is expected</a:t>
             </a:r>
           </a:p>
           <a:p>
@@ -1979,7 +1892,7 @@
             </a:pPr>
             <a:r>
               <a:rPr lang="en-US" b="0" noProof="0" dirty="0"/>
-              <a:t>We also add online learning, where not proactive or retraining occurs and the model is only updated using online learning methods</a:t>
+              <a:t>However, our proactive and retraining’s performance are almost identical throughout</a:t>
             </a:r>
           </a:p>
           <a:p>
@@ -1989,57 +1902,7 @@
             </a:pPr>
             <a:r>
               <a:rPr lang="en-US" b="0" noProof="0" dirty="0"/>
-              <a:t>One of our goal was to ensure the model stays up-to-date, specifically, </a:t>
-            </a:r>
-          </a:p>
-          <a:p>
-            <a:pPr marL="171450" indent="-171450">
-              <a:buFontTx/>
-              <a:buChar char="-"/>
-            </a:pPr>
-            <a:r>
-              <a:rPr lang="en-US" b="0" noProof="0" dirty="0"/>
-              <a:t>Can we do as good as retraining, when incomes to prediction accuracy or not</a:t>
-            </a:r>
-          </a:p>
-          <a:p>
-            <a:pPr marL="171450" indent="-171450">
-              <a:buFontTx/>
-              <a:buChar char="-"/>
-            </a:pPr>
-            <a:r>
-              <a:rPr lang="en-US" b="0" noProof="0" dirty="0"/>
-              <a:t>The figure shows the online learning not surprisingly perform worse than our approach and the retraining approach</a:t>
-            </a:r>
-          </a:p>
-          <a:p>
-            <a:pPr marL="171450" indent="-171450">
-              <a:buFontTx/>
-              <a:buChar char="-"/>
-            </a:pPr>
-            <a:r>
-              <a:rPr lang="en-US" b="0" noProof="0" dirty="0"/>
-              <a:t>However, our approach and retraining’s performance are almost identical throughout</a:t>
-            </a:r>
-          </a:p>
-          <a:p>
-            <a:pPr marL="171450" indent="-171450">
-              <a:buFontTx/>
-              <a:buChar char="-"/>
-            </a:pPr>
-            <a:r>
-              <a:rPr lang="en-US" b="0" noProof="0" dirty="0"/>
               <a:t>There some small differences, but the overall average error rate is identical</a:t>
-            </a:r>
-          </a:p>
-          <a:p>
-            <a:pPr marL="171450" indent="-171450">
-              <a:buFontTx/>
-              <a:buChar char="-"/>
-            </a:pPr>
-            <a:r>
-              <a:rPr lang="en-US" b="0" noProof="0" dirty="0"/>
-              <a:t>2:00</a:t>
             </a:r>
           </a:p>
         </p:txBody>
@@ -2124,25 +1987,13 @@
           <a:bodyPr/>
           <a:lstStyle/>
           <a:p>
-            <a:r>
-              <a:rPr lang="en-US" b="0" noProof="0" dirty="0"/>
-              <a:t>18:40</a:t>
-            </a:r>
-          </a:p>
-          <a:p>
-            <a:r>
-              <a:rPr lang="en-US" b="0" noProof="0" dirty="0"/>
-              <a:t>To evaluate the data processing performance of our platform,</a:t>
-            </a:r>
-          </a:p>
-          <a:p>
             <a:pPr marL="171450" indent="-171450">
               <a:buFontTx/>
               <a:buChar char="-"/>
             </a:pPr>
             <a:r>
               <a:rPr lang="en-US" b="0" noProof="0" dirty="0"/>
-              <a:t>Report the cumulative training time</a:t>
+              <a:t>19:20 – 21:20</a:t>
             </a:r>
           </a:p>
           <a:p>
@@ -2152,7 +2003,7 @@
             </a:pPr>
             <a:r>
               <a:rPr lang="en-US" b="0" noProof="0" dirty="0"/>
-              <a:t>Y shows the cumulative time in minutes</a:t>
+              <a:t>Other question: can we be almost as efficient as Online Learning</a:t>
             </a:r>
           </a:p>
           <a:p>
@@ -2162,7 +2013,7 @@
             </a:pPr>
             <a:r>
               <a:rPr lang="en-US" b="0" noProof="0" dirty="0"/>
-              <a:t>X shows the days</a:t>
+              <a:t>Cumulative training time each method spends training the model through out the deployment</a:t>
             </a:r>
           </a:p>
           <a:p>
@@ -2172,7 +2023,7 @@
             </a:pPr>
             <a:r>
               <a:rPr lang="en-US" b="0" noProof="0" dirty="0"/>
-              <a:t>All three approaches start similarly</a:t>
+              <a:t>Start the same, retraining becomes larger quite fast every retraining larger than the previous toward the end 800</a:t>
             </a:r>
           </a:p>
           <a:p>
@@ -2182,17 +2033,17 @@
             </a:pPr>
             <a:r>
               <a:rPr lang="en-US" b="0" noProof="0" dirty="0"/>
-              <a:t>Retraining after every retraining there’s sudden increase in the time</a:t>
-            </a:r>
-          </a:p>
-          <a:p>
-            <a:pPr marL="628650" lvl="1" indent="-171450">
+              <a:t>Proactive and Online cumulative time is slowly growing</a:t>
+            </a:r>
+          </a:p>
+          <a:p>
+            <a:pPr marL="171450" indent="-171450">
               <a:buFontTx/>
               <a:buChar char="-"/>
             </a:pPr>
             <a:r>
               <a:rPr lang="en-US" b="0" noProof="0" dirty="0"/>
-              <a:t>Toward the end since more data is collected retraining takes longer and longer</a:t>
+              <a:t>Towards the end proactive spends 50 15 times faster and online 30 </a:t>
             </a:r>
           </a:p>
           <a:p>
@@ -2202,67 +2053,7 @@
             </a:pPr>
             <a:r>
               <a:rPr lang="en-US" b="0" noProof="0" dirty="0"/>
-              <a:t>However, for proactive</a:t>
-            </a:r>
-          </a:p>
-          <a:p>
-            <a:pPr marL="628650" lvl="1" indent="-171450">
-              <a:buFontTx/>
-              <a:buChar char="-"/>
-            </a:pPr>
-            <a:r>
-              <a:rPr lang="en-US" b="0" noProof="0" dirty="0"/>
-              <a:t>Similar to the online learning</a:t>
-            </a:r>
-          </a:p>
-          <a:p>
-            <a:pPr marL="628650" lvl="1" indent="-171450">
-              <a:buFontTx/>
-              <a:buChar char="-"/>
-            </a:pPr>
-            <a:r>
-              <a:rPr lang="en-US" b="0" noProof="0" dirty="0"/>
-              <a:t>Retraining has spent 800 minutes in training the model</a:t>
-            </a:r>
-          </a:p>
-          <a:p>
-            <a:pPr marL="628650" lvl="1" indent="-171450">
-              <a:buFontTx/>
-              <a:buChar char="-"/>
-            </a:pPr>
-            <a:r>
-              <a:rPr lang="en-US" b="0" noProof="0" dirty="0"/>
-              <a:t>Proactive around 60 minutes almost 15 times faster than retraining</a:t>
-            </a:r>
-          </a:p>
-          <a:p>
-            <a:pPr marL="628650" lvl="1" indent="-171450">
-              <a:buFontTx/>
-              <a:buChar char="-"/>
-            </a:pPr>
-            <a:r>
-              <a:rPr lang="en-US" b="0" noProof="0" dirty="0"/>
-              <a:t>And online around 30 minutes</a:t>
-            </a:r>
-          </a:p>
-          <a:p>
-            <a:pPr marL="171450" lvl="0" indent="-171450">
-              <a:buFontTx/>
-              <a:buChar char="-"/>
-            </a:pPr>
-            <a:r>
-              <a:rPr lang="en-US" b="0" noProof="0" dirty="0"/>
               <a:t>Proactive training provides the same level of accuracy as the retraining approach while almost matching the speed of the online learning</a:t>
-            </a:r>
-          </a:p>
-          <a:p>
-            <a:pPr marL="171450" lvl="0" indent="-171450">
-              <a:buFontTx/>
-              <a:buChar char="-"/>
-            </a:pPr>
-            <a:r>
-              <a:rPr lang="en-US" b="0" noProof="0" dirty="0"/>
-              <a:t>2:00</a:t>
             </a:r>
           </a:p>
         </p:txBody>
@@ -2349,13 +2140,7 @@
           <a:p>
             <a:r>
               <a:rPr lang="en-US" dirty="0"/>
-              <a:t>20:40</a:t>
-            </a:r>
-          </a:p>
-          <a:p>
-            <a:r>
-              <a:rPr lang="en-US" dirty="0"/>
-              <a:t>Last experiment</a:t>
+              <a:t>- 21:20 – 23:10</a:t>
             </a:r>
           </a:p>
           <a:p>
@@ -2365,7 +2150,7 @@
             </a:pPr>
             <a:r>
               <a:rPr lang="en-US" dirty="0"/>
-              <a:t>Effect of Feature Caching and Statistics computation</a:t>
+              <a:t>Last experiment</a:t>
             </a:r>
           </a:p>
           <a:p>
@@ -2375,6 +2160,16 @@
             </a:pPr>
             <a:r>
               <a:rPr lang="en-US" dirty="0"/>
+              <a:t>Effect of Feature Caching and Statistics computation</a:t>
+            </a:r>
+          </a:p>
+          <a:p>
+            <a:pPr marL="171450" indent="-171450">
+              <a:buFont typeface="Arial" panose="020B0604020202020204" pitchFamily="34" charset="0"/>
+              <a:buChar char="•"/>
+            </a:pPr>
+            <a:r>
+              <a:rPr lang="en-US" dirty="0"/>
               <a:t>The figure shows the total training time for the proactive training in different situations</a:t>
             </a:r>
           </a:p>
@@ -2426,16 +2221,6 @@
             <a:r>
               <a:rPr lang="en-US" dirty="0"/>
               <a:t>In paper we explore both empirically and theoretically what happens when some portion, i.e., between 0 to 100% of the features are cached</a:t>
-            </a:r>
-          </a:p>
-          <a:p>
-            <a:pPr marL="171450" lvl="0" indent="-171450">
-              <a:buFont typeface="Arial" panose="020B0604020202020204" pitchFamily="34" charset="0"/>
-              <a:buChar char="•"/>
-            </a:pPr>
-            <a:r>
-              <a:rPr lang="en-US" dirty="0"/>
-              <a:t>2:00</a:t>
             </a:r>
           </a:p>
         </p:txBody>
@@ -2526,7 +2311,7 @@
             </a:pPr>
             <a:r>
               <a:rPr lang="en-US" dirty="0"/>
-              <a:t>22:40</a:t>
+              <a:t>23:10</a:t>
             </a:r>
           </a:p>
           <a:p>
@@ -2576,17 +2361,7 @@
             </a:pPr>
             <a:r>
               <a:rPr lang="en-US" dirty="0"/>
-              <a:t>00:50</a:t>
-            </a:r>
-          </a:p>
-          <a:p>
-            <a:pPr marL="171450" indent="-171450">
-              <a:buFontTx/>
-              <a:buChar char="-"/>
-            </a:pPr>
-            <a:r>
-              <a:rPr lang="en-US" dirty="0"/>
-              <a:t>23:30</a:t>
+              <a:t>24:10</a:t>
             </a:r>
           </a:p>
         </p:txBody>
@@ -2790,7 +2565,7 @@
           <a:p>
             <a:r>
               <a:rPr lang="en-US" dirty="0"/>
-              <a:t>1:00</a:t>
+              <a:t>1:00 – 2:10</a:t>
             </a:r>
           </a:p>
           <a:p>
@@ -2830,7 +2605,7 @@
             </a:pPr>
             <a:r>
               <a:rPr lang="en-US" dirty="0"/>
-              <a:t>And maintained and update and constantly improved </a:t>
+              <a:t>And maintained and update and constantly improved  </a:t>
             </a:r>
           </a:p>
           <a:p>
@@ -2840,7 +2615,7 @@
             </a:pPr>
             <a:r>
               <a:rPr lang="en-US" dirty="0"/>
-              <a:t>Focus of this time</a:t>
+              <a:t>Last two points is what we refer to the deployment of machine learning models and pipelines</a:t>
             </a:r>
           </a:p>
           <a:p>
@@ -2848,7 +2623,20 @@
               <a:buFont typeface="Arial" panose="020B0604020202020204" pitchFamily="34" charset="0"/>
               <a:buChar char="•"/>
             </a:pPr>
-            <a:endParaRPr lang="en-US" dirty="0"/>
+            <a:r>
+              <a:rPr lang="en-US" dirty="0"/>
+              <a:t>Focus of this time</a:t>
+            </a:r>
+          </a:p>
+          <a:p>
+            <a:pPr marL="171450" indent="-171450">
+              <a:buFont typeface="Arial" panose="020B0604020202020204" pitchFamily="34" charset="0"/>
+              <a:buChar char="•"/>
+            </a:pPr>
+            <a:r>
+              <a:rPr lang="en-US" dirty="0"/>
+              <a:t>Now let’s look into the current approaches for maintaining the model quality</a:t>
+            </a:r>
           </a:p>
           <a:p>
             <a:endParaRPr lang="en-US" dirty="0"/>
@@ -4006,7 +3794,7 @@
             </a:pPr>
             <a:r>
               <a:rPr lang="en-US" dirty="0"/>
-              <a:t>2:00</a:t>
+              <a:t>2:10 – 3:10</a:t>
             </a:r>
           </a:p>
           <a:p>
@@ -4077,6 +3865,16 @@
             <a:r>
               <a:rPr lang="en-US" dirty="0"/>
               <a:t>Cannot guarantee high quality models</a:t>
+            </a:r>
+          </a:p>
+          <a:p>
+            <a:pPr marL="628650" lvl="1" indent="-171450">
+              <a:buFont typeface="Arial" panose="020B0604020202020204" pitchFamily="34" charset="0"/>
+              <a:buChar char="•"/>
+            </a:pPr>
+            <a:r>
+              <a:rPr lang="en-US" dirty="0"/>
+              <a:t>They are susceptible to noise and may diverge if the incoming data distribution changes</a:t>
             </a:r>
           </a:p>
         </p:txBody>
@@ -4167,7 +3965,17 @@
             </a:pPr>
             <a:r>
               <a:rPr lang="en-US" dirty="0"/>
-              <a:t>3:00</a:t>
+              <a:t>3:10 – 4:50</a:t>
+            </a:r>
+          </a:p>
+          <a:p>
+            <a:pPr marL="171450" lvl="0" indent="-171450">
+              <a:buFont typeface="Arial" panose="020B0604020202020204" pitchFamily="34" charset="0"/>
+              <a:buChar char="•"/>
+            </a:pPr>
+            <a:r>
+              <a:rPr lang="en-US" dirty="0"/>
+              <a:t>To alleviate the problem of online learning</a:t>
             </a:r>
           </a:p>
           <a:p>
@@ -4374,7 +4182,7 @@
           <a:p>
             <a:r>
               <a:rPr lang="en-US" dirty="0"/>
-              <a:t>4:00</a:t>
+              <a:t>4:50 – 5:20</a:t>
             </a:r>
           </a:p>
           <a:p>
@@ -4404,27 +4212,7 @@
             </a:pPr>
             <a:r>
               <a:rPr lang="en-US" dirty="0"/>
-              <a:t>we believe the overhead of complete retraining is too much and frankly unnecessary </a:t>
-            </a:r>
-          </a:p>
-          <a:p>
-            <a:pPr marL="628650" lvl="1" indent="-171450">
-              <a:buFont typeface="Arial" panose="020B0604020202020204" pitchFamily="34" charset="0"/>
-              <a:buChar char="•"/>
-            </a:pPr>
-            <a:r>
-              <a:rPr lang="en-US" dirty="0"/>
-              <a:t>Specially, since we believe since we’re doing online learning anyway, we can be precompute many things that later on will be required by the retraining</a:t>
-            </a:r>
-          </a:p>
-          <a:p>
-            <a:pPr marL="628650" lvl="1" indent="-171450">
-              <a:buFont typeface="Arial" panose="020B0604020202020204" pitchFamily="34" charset="0"/>
-              <a:buChar char="•"/>
-            </a:pPr>
-            <a:r>
-              <a:rPr lang="en-US" dirty="0"/>
-              <a:t>However, this means we cannot perform the retraining out-of-core.</a:t>
+              <a:t>we observe that the overhead of complete retraining is too much and frankly unnecessary since we think there is no need to retrain a new model completely from scratch </a:t>
             </a:r>
           </a:p>
         </p:txBody>
@@ -4515,7 +4303,53 @@
             </a:pPr>
             <a:r>
               <a:rPr lang="en-US" dirty="0"/>
-              <a:t>5:00</a:t>
+              <a:t>5:20 - 7:10</a:t>
+            </a:r>
+          </a:p>
+          <a:p>
+            <a:pPr marL="171450" marR="0" lvl="0" indent="-171450" algn="l" defTabSz="914400" rtl="0" eaLnBrk="1" fontAlgn="auto" latinLnBrk="0" hangingPunct="1">
+              <a:lnSpc>
+                <a:spcPct val="100000"/>
+              </a:lnSpc>
+              <a:spcBef>
+                <a:spcPts val="0"/>
+              </a:spcBef>
+              <a:spcAft>
+                <a:spcPts val="0"/>
+              </a:spcAft>
+              <a:buClrTx/>
+              <a:buSzTx/>
+              <a:buFontTx/>
+              <a:buChar char="-"/>
+              <a:tabLst/>
+              <a:defRPr/>
+            </a:pPr>
+            <a:r>
+              <a:rPr lang="en-US" dirty="0"/>
+              <a:t>Continuous deployment platform</a:t>
+            </a:r>
+          </a:p>
+          <a:p>
+            <a:pPr marL="171450" marR="0" lvl="0" indent="-171450" algn="l" defTabSz="914400" rtl="0" eaLnBrk="1" fontAlgn="auto" latinLnBrk="0" hangingPunct="1">
+              <a:lnSpc>
+                <a:spcPct val="100000"/>
+              </a:lnSpc>
+              <a:spcBef>
+                <a:spcPts val="0"/>
+              </a:spcBef>
+              <a:spcAft>
+                <a:spcPts val="0"/>
+              </a:spcAft>
+              <a:buClrTx/>
+              <a:buSzTx/>
+              <a:buFontTx/>
+              <a:buChar char="-"/>
+              <a:tabLst/>
+              <a:defRPr/>
+            </a:pPr>
+            <a:r>
+              <a:rPr lang="en-US" dirty="0"/>
+              <a:t>With the goal of maintaining the quality of deployed model efficiently</a:t>
             </a:r>
           </a:p>
           <a:p>
@@ -4525,7 +4359,7 @@
             </a:pPr>
             <a:r>
               <a:rPr lang="en-US" dirty="0"/>
-              <a:t>A continuous deployment platform</a:t>
+              <a:t>online learning and  train the model  with the historical data inside the platform</a:t>
             </a:r>
           </a:p>
           <a:p>
@@ -4535,7 +4369,7 @@
             </a:pPr>
             <a:r>
               <a:rPr lang="en-US" dirty="0"/>
-              <a:t>With the goal of maintaining the quality of deployed model efficiently</a:t>
+              <a:t>This means Stores all the historical data meaning, initial data and data that arrives since the beginning of time</a:t>
             </a:r>
           </a:p>
           <a:p>
@@ -4545,27 +4379,7 @@
             </a:pPr>
             <a:r>
               <a:rPr lang="en-US" dirty="0"/>
-              <a:t>Similar to existing approaches, performs online learning</a:t>
-            </a:r>
-          </a:p>
-          <a:p>
-            <a:pPr marL="171450" indent="-171450">
-              <a:buFontTx/>
-              <a:buChar char="-"/>
-            </a:pPr>
-            <a:r>
-              <a:rPr lang="en-US" dirty="0"/>
-              <a:t>However unlike existing approaches, further training of the model is performed inside the platform itself.</a:t>
-            </a:r>
-          </a:p>
-          <a:p>
-            <a:pPr marL="171450" indent="-171450">
-              <a:buFontTx/>
-              <a:buChar char="-"/>
-            </a:pPr>
-            <a:r>
-              <a:rPr lang="en-US" dirty="0"/>
-              <a:t>This means</a:t>
+              <a:t>We make three contributions </a:t>
             </a:r>
           </a:p>
           <a:p>
@@ -4575,7 +4389,7 @@
             </a:pPr>
             <a:r>
               <a:rPr lang="en-US" dirty="0"/>
-              <a:t>Stores all the historical data meaning, initial data and data that arrives since the beginning of time</a:t>
+              <a:t>Propose an approach for Precompute the features and cached them for further training</a:t>
             </a:r>
           </a:p>
           <a:p>
@@ -4585,17 +4399,7 @@
             </a:pPr>
             <a:r>
               <a:rPr lang="en-US" dirty="0"/>
-              <a:t>we can precompute the data the training will need later on during to speed up the process.</a:t>
-            </a:r>
-          </a:p>
-          <a:p>
-            <a:pPr marL="171450" indent="-171450">
-              <a:buFontTx/>
-              <a:buChar char="-"/>
-            </a:pPr>
-            <a:r>
-              <a:rPr lang="en-US" dirty="0"/>
-              <a:t>We make three contributions </a:t>
+              <a:t>Update the statistics required by the components of the pipeline which will speed up the data processing at later stages</a:t>
             </a:r>
           </a:p>
           <a:p>
@@ -4605,7 +4409,7 @@
             </a:pPr>
             <a:r>
               <a:rPr lang="en-US" dirty="0"/>
-              <a:t>Precompute the features and cached them</a:t>
+              <a:t>Propose a training approach called the proactive training which replaces replacement of retraining</a:t>
             </a:r>
           </a:p>
           <a:p>
@@ -4615,17 +4419,7 @@
             </a:pPr>
             <a:r>
               <a:rPr lang="en-US" dirty="0"/>
-              <a:t>Update the statistics required by the pipeline</a:t>
-            </a:r>
-          </a:p>
-          <a:p>
-            <a:pPr marL="628650" lvl="1" indent="-171450">
-              <a:buFontTx/>
-              <a:buChar char="-"/>
-            </a:pPr>
-            <a:r>
-              <a:rPr lang="en-US" dirty="0"/>
-              <a:t>Perform proactive training which is a replacement of retraining</a:t>
+              <a:t>Proactive Training </a:t>
             </a:r>
           </a:p>
           <a:p>
@@ -4635,7 +4429,7 @@
             </a:pPr>
             <a:r>
               <a:rPr lang="en-US" dirty="0"/>
-              <a:t>Which directly applied to the deployed model</a:t>
+              <a:t>Is directly applied to the deployed model</a:t>
             </a:r>
           </a:p>
           <a:p>
@@ -4646,6 +4440,16 @@
             <a:r>
               <a:rPr lang="en-US" dirty="0"/>
               <a:t>Uses the precomputed features and the updated statistics to speed up the process</a:t>
+            </a:r>
+          </a:p>
+          <a:p>
+            <a:pPr marL="171450" lvl="0" indent="-171450">
+              <a:buFontTx/>
+              <a:buChar char="-"/>
+            </a:pPr>
+            <a:r>
+              <a:rPr lang="en-US" dirty="0"/>
+              <a:t>In next set of slides, I will discuss the details of our platform and the optimizations that we perform</a:t>
             </a:r>
           </a:p>
         </p:txBody>
@@ -4736,7 +4540,7 @@
             </a:pPr>
             <a:r>
               <a:rPr lang="en-US" dirty="0"/>
-              <a:t>6:30</a:t>
+              <a:t>7:10 – 7:20</a:t>
             </a:r>
           </a:p>
           <a:p>
@@ -4844,7 +4648,7 @@
             </a:pPr>
             <a:r>
               <a:rPr lang="en-US" dirty="0"/>
-              <a:t>7:00</a:t>
+              <a:t>7:20 – 7:50</a:t>
             </a:r>
           </a:p>
           <a:p>
@@ -4978,7 +4782,7 @@
           <a:p>
             <a:r>
               <a:rPr lang="en-US" dirty="0"/>
-              <a:t>-  7:30</a:t>
+              <a:t>-  7:50 – 8:20</a:t>
             </a:r>
           </a:p>
           <a:p>
@@ -4998,7 +4802,7 @@
             </a:pPr>
             <a:r>
               <a:rPr lang="en-US" dirty="0"/>
-              <a:t>Where we replace the retraining with a more efficient process</a:t>
+              <a:t>Replace Retraining with more efficient process</a:t>
             </a:r>
           </a:p>
           <a:p>
@@ -5008,7 +4812,7 @@
             </a:pPr>
             <a:r>
               <a:rPr lang="en-US" dirty="0"/>
-              <a:t>Where it uses the cached features compute earlier to train the deployed model</a:t>
+              <a:t>Uses cached features and computed statistics</a:t>
             </a:r>
           </a:p>
           <a:p>
@@ -5018,7 +4822,27 @@
             </a:pPr>
             <a:r>
               <a:rPr lang="en-US" dirty="0"/>
-              <a:t>Next I will now discuss the details of the preparation and proactive training phase and then finish with evaluation results</a:t>
+              <a:t>Details of</a:t>
+            </a:r>
+          </a:p>
+          <a:p>
+            <a:pPr marL="628650" lvl="1" indent="-171450">
+              <a:buFont typeface="Arial" panose="020B0604020202020204" pitchFamily="34" charset="0"/>
+              <a:buChar char="•"/>
+            </a:pPr>
+            <a:r>
+              <a:rPr lang="en-US" dirty="0"/>
+              <a:t>Data Preparation Phase</a:t>
+            </a:r>
+          </a:p>
+          <a:p>
+            <a:pPr marL="628650" lvl="1" indent="-171450">
+              <a:buFont typeface="Arial" panose="020B0604020202020204" pitchFamily="34" charset="0"/>
+              <a:buChar char="•"/>
+            </a:pPr>
+            <a:r>
+              <a:rPr lang="en-US" dirty="0"/>
+              <a:t>Proactive Training Phase</a:t>
             </a:r>
           </a:p>
         </p:txBody>
@@ -8143,7 +7967,7 @@
           <a:p>
             <a:fld id="{76CD1432-64B4-2849-9FF0-D63429878E8E}" type="datetimeFigureOut">
               <a:rPr lang="en-US" smtClean="0"/>
-              <a:t>3/27/19</a:t>
+              <a:t>3/28/19</a:t>
             </a:fld>
             <a:endParaRPr lang="en-US" dirty="0"/>
           </a:p>
@@ -8357,7 +8181,7 @@
             <a:fld id="{28528B96-7568-41D8-96CE-502631A70B8A}" type="datetime1">
               <a:rPr lang="de-DE" sz="1600" smtClean="0"/>
               <a:pPr algn="ctr"/>
-              <a:t>27.03.19</a:t>
+              <a:t>28.03.19</a:t>
             </a:fld>
             <a:endParaRPr lang="de-DE" sz="1200" dirty="0"/>
           </a:p>
@@ -8883,11 +8707,11 @@
   <p:clrMapOvr>
     <a:masterClrMapping/>
   </p:clrMapOvr>
-  <mc:AlternateContent xmlns:mc="http://schemas.openxmlformats.org/markup-compatibility/2006">
-    <mc:Choice xmlns:p14="http://schemas.microsoft.com/office/powerpoint/2010/main" Requires="p14">
+  <mc:AlternateContent xmlns:mc="http://schemas.openxmlformats.org/markup-compatibility/2006" xmlns:p14="http://schemas.microsoft.com/office/powerpoint/2010/main">
+    <mc:Choice Requires="p14">
       <p:transition p14:dur="0"/>
     </mc:Choice>
-    <mc:Fallback>
+    <mc:Fallback xmlns="">
       <p:transition/>
     </mc:Fallback>
   </mc:AlternateContent>
@@ -12417,11 +12241,11 @@
   <p:clrMapOvr>
     <a:masterClrMapping/>
   </p:clrMapOvr>
-  <mc:AlternateContent xmlns:mc="http://schemas.openxmlformats.org/markup-compatibility/2006">
-    <mc:Choice xmlns:p14="http://schemas.microsoft.com/office/powerpoint/2010/main" Requires="p14">
+  <mc:AlternateContent xmlns:mc="http://schemas.openxmlformats.org/markup-compatibility/2006" xmlns:p14="http://schemas.microsoft.com/office/powerpoint/2010/main">
+    <mc:Choice Requires="p14">
       <p:transition p14:dur="0"/>
     </mc:Choice>
-    <mc:Fallback>
+    <mc:Fallback xmlns="">
       <p:transition/>
     </mc:Fallback>
   </mc:AlternateContent>
@@ -15700,11 +15524,11 @@
   <p:clrMapOvr>
     <a:masterClrMapping/>
   </p:clrMapOvr>
-  <mc:AlternateContent xmlns:mc="http://schemas.openxmlformats.org/markup-compatibility/2006">
-    <mc:Choice xmlns:p14="http://schemas.microsoft.com/office/powerpoint/2010/main" Requires="p14">
+  <mc:AlternateContent xmlns:mc="http://schemas.openxmlformats.org/markup-compatibility/2006" xmlns:p14="http://schemas.microsoft.com/office/powerpoint/2010/main">
+    <mc:Choice Requires="p14">
       <p:transition p14:dur="0"/>
     </mc:Choice>
-    <mc:Fallback>
+    <mc:Fallback xmlns="">
       <p:transition/>
     </mc:Fallback>
   </mc:AlternateContent>
@@ -18732,101 +18556,6 @@
       </p:sp>
       <p:sp>
         <p:nvSpPr>
-          <p:cNvPr id="64" name="Rounded Rectangle 63">
-            <a:extLst>
-              <a:ext uri="{FF2B5EF4-FFF2-40B4-BE49-F238E27FC236}">
-                <a16:creationId xmlns:a16="http://schemas.microsoft.com/office/drawing/2014/main" id="{BC2618E6-A978-174D-8D3A-DCFC7B8911A3}"/>
-              </a:ext>
-            </a:extLst>
-          </p:cNvPr>
-          <p:cNvSpPr/>
-          <p:nvPr/>
-        </p:nvSpPr>
-        <p:spPr>
-          <a:xfrm>
-            <a:off x="7428340" y="3248143"/>
-            <a:ext cx="202330" cy="202330"/>
-          </a:xfrm>
-          <a:prstGeom prst="roundRect">
-            <a:avLst/>
-          </a:prstGeom>
-          <a:solidFill>
-            <a:schemeClr val="accent6"/>
-          </a:solidFill>
-        </p:spPr>
-        <p:style>
-          <a:lnRef idx="2">
-            <a:schemeClr val="accent6">
-              <a:shade val="50000"/>
-            </a:schemeClr>
-          </a:lnRef>
-          <a:fillRef idx="1">
-            <a:schemeClr val="accent6"/>
-          </a:fillRef>
-          <a:effectRef idx="0">
-            <a:schemeClr val="accent6"/>
-          </a:effectRef>
-          <a:fontRef idx="minor">
-            <a:schemeClr val="lt1"/>
-          </a:fontRef>
-        </p:style>
-        <p:txBody>
-          <a:bodyPr rtlCol="0" anchor="ctr"/>
-          <a:lstStyle/>
-          <a:p>
-            <a:pPr algn="ctr"/>
-            <a:endParaRPr lang="en-US" dirty="0"/>
-          </a:p>
-        </p:txBody>
-      </p:sp>
-      <p:cxnSp>
-        <p:nvCxnSpPr>
-          <p:cNvPr id="65" name="Straight Arrow Connector 64">
-            <a:extLst>
-              <a:ext uri="{FF2B5EF4-FFF2-40B4-BE49-F238E27FC236}">
-                <a16:creationId xmlns:a16="http://schemas.microsoft.com/office/drawing/2014/main" id="{D1577F58-4AFC-2249-9C36-5552EB18A33B}"/>
-              </a:ext>
-            </a:extLst>
-          </p:cNvPr>
-          <p:cNvCxnSpPr>
-            <a:cxnSpLocks/>
-            <a:stCxn id="63" idx="2"/>
-            <a:endCxn id="64" idx="0"/>
-          </p:cNvCxnSpPr>
-          <p:nvPr/>
-        </p:nvCxnSpPr>
-        <p:spPr>
-          <a:xfrm>
-            <a:off x="7527850" y="2923311"/>
-            <a:ext cx="1655" cy="324832"/>
-          </a:xfrm>
-          <a:prstGeom prst="straightConnector1">
-            <a:avLst/>
-          </a:prstGeom>
-          <a:ln w="15875">
-            <a:solidFill>
-              <a:schemeClr val="tx1"/>
-            </a:solidFill>
-            <a:tailEnd type="none" w="lg" len="lg"/>
-          </a:ln>
-        </p:spPr>
-        <p:style>
-          <a:lnRef idx="1">
-            <a:schemeClr val="accent1"/>
-          </a:lnRef>
-          <a:fillRef idx="0">
-            <a:schemeClr val="accent1"/>
-          </a:fillRef>
-          <a:effectRef idx="0">
-            <a:schemeClr val="accent1"/>
-          </a:effectRef>
-          <a:fontRef idx="minor">
-            <a:schemeClr val="tx1"/>
-          </a:fontRef>
-        </p:style>
-      </p:cxnSp>
-      <p:sp>
-        <p:nvSpPr>
           <p:cNvPr id="84" name="Rectangle 83">
             <a:extLst>
               <a:ext uri="{FF2B5EF4-FFF2-40B4-BE49-F238E27FC236}">
@@ -18882,6 +18611,55 @@
       </p:sp>
       <p:sp>
         <p:nvSpPr>
+          <p:cNvPr id="64" name="Rounded Rectangle 63">
+            <a:extLst>
+              <a:ext uri="{FF2B5EF4-FFF2-40B4-BE49-F238E27FC236}">
+                <a16:creationId xmlns:a16="http://schemas.microsoft.com/office/drawing/2014/main" id="{BC2618E6-A978-174D-8D3A-DCFC7B8911A3}"/>
+              </a:ext>
+            </a:extLst>
+          </p:cNvPr>
+          <p:cNvSpPr/>
+          <p:nvPr/>
+        </p:nvSpPr>
+        <p:spPr>
+          <a:xfrm>
+            <a:off x="7428340" y="3248143"/>
+            <a:ext cx="202330" cy="202330"/>
+          </a:xfrm>
+          <a:prstGeom prst="roundRect">
+            <a:avLst/>
+          </a:prstGeom>
+          <a:solidFill>
+            <a:schemeClr val="accent6"/>
+          </a:solidFill>
+        </p:spPr>
+        <p:style>
+          <a:lnRef idx="2">
+            <a:schemeClr val="accent6">
+              <a:shade val="50000"/>
+            </a:schemeClr>
+          </a:lnRef>
+          <a:fillRef idx="1">
+            <a:schemeClr val="accent6"/>
+          </a:fillRef>
+          <a:effectRef idx="0">
+            <a:schemeClr val="accent6"/>
+          </a:effectRef>
+          <a:fontRef idx="minor">
+            <a:schemeClr val="lt1"/>
+          </a:fontRef>
+        </p:style>
+        <p:txBody>
+          <a:bodyPr rtlCol="0" anchor="ctr"/>
+          <a:lstStyle/>
+          <a:p>
+            <a:pPr algn="ctr"/>
+            <a:endParaRPr lang="en-US" dirty="0"/>
+          </a:p>
+        </p:txBody>
+      </p:sp>
+      <p:sp>
+        <p:nvSpPr>
           <p:cNvPr id="85" name="TextBox 84">
             <a:extLst>
               <a:ext uri="{FF2B5EF4-FFF2-40B4-BE49-F238E27FC236}">
@@ -18894,8 +18672,8 @@
         </p:nvSpPr>
         <p:spPr>
           <a:xfrm>
-            <a:off x="6188911" y="5428341"/>
-            <a:ext cx="1078821" cy="707886"/>
+            <a:off x="6320198" y="5428341"/>
+            <a:ext cx="816249" cy="707886"/>
           </a:xfrm>
           <a:prstGeom prst="rect">
             <a:avLst/>
@@ -18911,18 +18689,64 @@
             <a:pPr algn="ctr"/>
             <a:r>
               <a:rPr lang="en-US" sz="2000" dirty="0"/>
-              <a:t>Memory</a:t>
+              <a:t>Cache</a:t>
             </a:r>
           </a:p>
           <a:p>
             <a:pPr algn="ctr"/>
             <a:r>
               <a:rPr lang="en-US" sz="2000" dirty="0"/>
-              <a:t>or Disk</a:t>
-            </a:r>
-          </a:p>
-        </p:txBody>
-      </p:sp>
+              <a:t>Layer</a:t>
+            </a:r>
+          </a:p>
+        </p:txBody>
+      </p:sp>
+      <p:cxnSp>
+        <p:nvCxnSpPr>
+          <p:cNvPr id="65" name="Straight Arrow Connector 64">
+            <a:extLst>
+              <a:ext uri="{FF2B5EF4-FFF2-40B4-BE49-F238E27FC236}">
+                <a16:creationId xmlns:a16="http://schemas.microsoft.com/office/drawing/2014/main" id="{D1577F58-4AFC-2249-9C36-5552EB18A33B}"/>
+              </a:ext>
+            </a:extLst>
+          </p:cNvPr>
+          <p:cNvCxnSpPr>
+            <a:cxnSpLocks/>
+            <a:stCxn id="63" idx="2"/>
+            <a:endCxn id="64" idx="0"/>
+          </p:cNvCxnSpPr>
+          <p:nvPr/>
+        </p:nvCxnSpPr>
+        <p:spPr>
+          <a:xfrm>
+            <a:off x="7527850" y="2923311"/>
+            <a:ext cx="1655" cy="324832"/>
+          </a:xfrm>
+          <a:prstGeom prst="straightConnector1">
+            <a:avLst/>
+          </a:prstGeom>
+          <a:ln w="15875">
+            <a:solidFill>
+              <a:schemeClr val="tx1"/>
+            </a:solidFill>
+            <a:tailEnd type="none" w="lg" len="lg"/>
+          </a:ln>
+        </p:spPr>
+        <p:style>
+          <a:lnRef idx="1">
+            <a:schemeClr val="accent1"/>
+          </a:lnRef>
+          <a:fillRef idx="0">
+            <a:schemeClr val="accent1"/>
+          </a:fillRef>
+          <a:effectRef idx="0">
+            <a:schemeClr val="accent1"/>
+          </a:effectRef>
+          <a:fontRef idx="minor">
+            <a:schemeClr val="tx1"/>
+          </a:fontRef>
+        </p:style>
+      </p:cxnSp>
       <mc:AlternateContent xmlns:mc="http://schemas.openxmlformats.org/markup-compatibility/2006" xmlns:a14="http://schemas.microsoft.com/office/drawing/2010/main">
         <mc:Choice Requires="a14">
           <p:sp>
@@ -20078,11 +19902,11 @@
   <p:clrMapOvr>
     <a:masterClrMapping/>
   </p:clrMapOvr>
-  <mc:AlternateContent xmlns:mc="http://schemas.openxmlformats.org/markup-compatibility/2006">
-    <mc:Choice xmlns:p14="http://schemas.microsoft.com/office/powerpoint/2010/main" Requires="p14">
+  <mc:AlternateContent xmlns:mc="http://schemas.openxmlformats.org/markup-compatibility/2006" xmlns:p14="http://schemas.microsoft.com/office/powerpoint/2010/main">
+    <mc:Choice Requires="p14">
       <p:transition p14:dur="0"/>
     </mc:Choice>
-    <mc:Fallback>
+    <mc:Fallback xmlns="">
       <p:transition/>
     </mc:Fallback>
   </mc:AlternateContent>
@@ -24026,8 +23850,8 @@
         </p:nvSpPr>
         <p:spPr>
           <a:xfrm>
-            <a:off x="6188911" y="5428341"/>
-            <a:ext cx="1078821" cy="707886"/>
+            <a:off x="6320197" y="5428341"/>
+            <a:ext cx="816249" cy="707886"/>
           </a:xfrm>
           <a:prstGeom prst="rect">
             <a:avLst/>
@@ -24043,14 +23867,14 @@
             <a:pPr algn="ctr"/>
             <a:r>
               <a:rPr lang="en-US" sz="2000" dirty="0"/>
-              <a:t>Memory</a:t>
+              <a:t>Cache</a:t>
             </a:r>
           </a:p>
           <a:p>
             <a:pPr algn="ctr"/>
             <a:r>
               <a:rPr lang="en-US" sz="2000" dirty="0"/>
-              <a:t>or Disk</a:t>
+              <a:t>Layer</a:t>
             </a:r>
           </a:p>
         </p:txBody>
@@ -24099,11 +23923,11 @@
   <p:clrMapOvr>
     <a:masterClrMapping/>
   </p:clrMapOvr>
-  <mc:AlternateContent xmlns:mc="http://schemas.openxmlformats.org/markup-compatibility/2006">
-    <mc:Choice xmlns:p14="http://schemas.microsoft.com/office/powerpoint/2010/main" Requires="p14">
+  <mc:AlternateContent xmlns:mc="http://schemas.openxmlformats.org/markup-compatibility/2006" xmlns:p14="http://schemas.microsoft.com/office/powerpoint/2010/main">
+    <mc:Choice Requires="p14">
       <p:transition p14:dur="0"/>
     </mc:Choice>
-    <mc:Fallback>
+    <mc:Fallback xmlns="">
       <p:transition/>
     </mc:Fallback>
   </mc:AlternateContent>
@@ -25438,11 +25262,11 @@
   <p:clrMapOvr>
     <a:masterClrMapping/>
   </p:clrMapOvr>
-  <mc:AlternateContent xmlns:mc="http://schemas.openxmlformats.org/markup-compatibility/2006">
-    <mc:Choice xmlns:p14="http://schemas.microsoft.com/office/powerpoint/2010/main" Requires="p14">
+  <mc:AlternateContent xmlns:mc="http://schemas.openxmlformats.org/markup-compatibility/2006" xmlns:p14="http://schemas.microsoft.com/office/powerpoint/2010/main">
+    <mc:Choice Requires="p14">
       <p:transition p14:dur="0"/>
     </mc:Choice>
-    <mc:Fallback>
+    <mc:Fallback xmlns="">
       <p:transition/>
     </mc:Fallback>
   </mc:AlternateContent>
@@ -25612,11 +25436,11 @@
   <p:clrMapOvr>
     <a:masterClrMapping/>
   </p:clrMapOvr>
-  <mc:AlternateContent xmlns:mc="http://schemas.openxmlformats.org/markup-compatibility/2006">
-    <mc:Choice xmlns:p14="http://schemas.microsoft.com/office/powerpoint/2010/main" Requires="p14">
+  <mc:AlternateContent xmlns:mc="http://schemas.openxmlformats.org/markup-compatibility/2006" xmlns:p14="http://schemas.microsoft.com/office/powerpoint/2010/main">
+    <mc:Choice Requires="p14">
       <p:transition p14:dur="0"/>
     </mc:Choice>
-    <mc:Fallback>
+    <mc:Fallback xmlns="">
       <p:transition/>
     </mc:Fallback>
   </mc:AlternateContent>
@@ -25896,8 +25720,8 @@
         </p:nvSpPr>
         <p:spPr>
           <a:xfrm>
-            <a:off x="0" y="5589640"/>
-            <a:ext cx="12192000" cy="855406"/>
+            <a:off x="108000" y="5589640"/>
+            <a:ext cx="11959200" cy="855406"/>
           </a:xfrm>
           <a:prstGeom prst="roundRect">
             <a:avLst/>
@@ -25939,11 +25763,11 @@
   <p:clrMapOvr>
     <a:masterClrMapping/>
   </p:clrMapOvr>
-  <mc:AlternateContent xmlns:mc="http://schemas.openxmlformats.org/markup-compatibility/2006">
-    <mc:Choice xmlns:p14="http://schemas.microsoft.com/office/powerpoint/2010/main" Requires="p14">
+  <mc:AlternateContent xmlns:mc="http://schemas.openxmlformats.org/markup-compatibility/2006" xmlns:p14="http://schemas.microsoft.com/office/powerpoint/2010/main">
+    <mc:Choice Requires="p14">
       <p:transition p14:dur="0"/>
     </mc:Choice>
-    <mc:Fallback>
+    <mc:Fallback xmlns="">
       <p:transition/>
     </mc:Fallback>
   </mc:AlternateContent>
@@ -26160,8 +25984,8 @@
         </p:nvSpPr>
         <p:spPr>
           <a:xfrm>
-            <a:off x="630647" y="910461"/>
-            <a:ext cx="9932912" cy="523220"/>
+            <a:off x="436652" y="910461"/>
+            <a:ext cx="10320902" cy="523220"/>
           </a:xfrm>
           <a:prstGeom prst="rect">
             <a:avLst/>
@@ -26176,7 +26000,7 @@
             <a:pPr algn="ctr"/>
             <a:r>
               <a:rPr lang="en-US" sz="2800" dirty="0"/>
-              <a:t>What is the effect of </a:t>
+              <a:t>What are the effects of </a:t>
             </a:r>
             <a:r>
               <a:rPr lang="en-US" sz="2800" b="1" dirty="0"/>
@@ -26276,8 +26100,8 @@
         </p:nvSpPr>
         <p:spPr>
           <a:xfrm>
-            <a:off x="0" y="5589640"/>
-            <a:ext cx="12192000" cy="855406"/>
+            <a:off x="108000" y="5590800"/>
+            <a:ext cx="11959200" cy="855406"/>
           </a:xfrm>
           <a:prstGeom prst="roundRect">
             <a:avLst/>
@@ -26319,11 +26143,11 @@
   <p:clrMapOvr>
     <a:masterClrMapping/>
   </p:clrMapOvr>
-  <mc:AlternateContent xmlns:mc="http://schemas.openxmlformats.org/markup-compatibility/2006">
-    <mc:Choice xmlns:p14="http://schemas.microsoft.com/office/powerpoint/2010/main" Requires="p14">
+  <mc:AlternateContent xmlns:mc="http://schemas.openxmlformats.org/markup-compatibility/2006" xmlns:p14="http://schemas.microsoft.com/office/powerpoint/2010/main">
+    <mc:Choice Requires="p14">
       <p:transition p14:dur="0"/>
     </mc:Choice>
-    <mc:Fallback>
+    <mc:Fallback xmlns="">
       <p:transition/>
     </mc:Fallback>
   </mc:AlternateContent>
@@ -26380,51 +26204,6 @@
                       </p:childTnLst>
                     </p:cTn>
                   </p:par>
-                  <p:par>
-                    <p:cTn id="7" fill="hold">
-                      <p:stCondLst>
-                        <p:cond delay="indefinite"/>
-                      </p:stCondLst>
-                      <p:childTnLst>
-                        <p:par>
-                          <p:cTn id="8" fill="hold">
-                            <p:stCondLst>
-                              <p:cond delay="0"/>
-                            </p:stCondLst>
-                            <p:childTnLst>
-                              <p:par>
-                                <p:cTn id="9" presetID="1" presetClass="entr" presetSubtype="0" fill="hold" grpId="1" nodeType="clickEffect">
-                                  <p:stCondLst>
-                                    <p:cond delay="0"/>
-                                  </p:stCondLst>
-                                  <p:childTnLst>
-                                    <p:set>
-                                      <p:cBhvr>
-                                        <p:cTn id="10" dur="1" fill="hold">
-                                          <p:stCondLst>
-                                            <p:cond delay="0"/>
-                                          </p:stCondLst>
-                                        </p:cTn>
-                                        <p:tgtEl>
-                                          <p:spTgt spid="10"/>
-                                        </p:tgtEl>
-                                        <p:attrNameLst>
-                                          <p:attrName>style.visibility</p:attrName>
-                                        </p:attrNameLst>
-                                      </p:cBhvr>
-                                      <p:to>
-                                        <p:strVal val="visible"/>
-                                      </p:to>
-                                    </p:set>
-                                  </p:childTnLst>
-                                </p:cTn>
-                              </p:par>
-                            </p:childTnLst>
-                          </p:cTn>
-                        </p:par>
-                      </p:childTnLst>
-                    </p:cTn>
-                  </p:par>
                 </p:childTnLst>
               </p:cTn>
               <p:prevCondLst>
@@ -26448,7 +26227,6 @@
     </p:tnLst>
     <p:bldLst>
       <p:bldP spid="10" grpId="0" animBg="1"/>
-      <p:bldP spid="10" grpId="1" animBg="1"/>
     </p:bldLst>
   </p:timing>
 </p:sld>
@@ -26549,7 +26327,7 @@
             </a:pPr>
             <a:r>
               <a:rPr lang="en-US" sz="2400" dirty="0"/>
-              <a:t>Online Statistics Computation</a:t>
+              <a:t>Feature Caching</a:t>
             </a:r>
           </a:p>
           <a:p>
@@ -26559,23 +26337,7 @@
             </a:pPr>
             <a:r>
               <a:rPr lang="en-US" sz="2400" dirty="0"/>
-              <a:t>Dynamic Materialization of data</a:t>
-            </a:r>
-          </a:p>
-          <a:p>
-            <a:pPr marL="742950" lvl="1" indent="-285750">
-              <a:buFont typeface="Arial" panose="020B0604020202020204" pitchFamily="34" charset="0"/>
-              <a:buChar char="•"/>
-            </a:pPr>
-            <a:r>
-              <a:rPr lang="en-US" sz="2400" dirty="0">
-                <a:solidFill>
-                  <a:schemeClr val="accent6">
-                    <a:lumMod val="50000"/>
-                  </a:schemeClr>
-                </a:solidFill>
-              </a:rPr>
-              <a:t>Achieves similar quality</a:t>
+              <a:t>Online Statistics Computation</a:t>
             </a:r>
           </a:p>
           <a:p>
@@ -26592,6 +26354,22 @@
                 </a:solidFill>
               </a:rPr>
               <a:t>Reduces the total training time</a:t>
+            </a:r>
+          </a:p>
+          <a:p>
+            <a:pPr marL="742950" lvl="1" indent="-285750">
+              <a:buFont typeface="Arial" panose="020B0604020202020204" pitchFamily="34" charset="0"/>
+              <a:buChar char="•"/>
+            </a:pPr>
+            <a:r>
+              <a:rPr lang="en-US" sz="2400" dirty="0">
+                <a:solidFill>
+                  <a:schemeClr val="accent6">
+                    <a:lumMod val="50000"/>
+                  </a:schemeClr>
+                </a:solidFill>
+              </a:rPr>
+              <a:t>Achieves high quality</a:t>
             </a:r>
           </a:p>
           <a:p>
@@ -28349,11 +28127,11 @@
   <p:clrMapOvr>
     <a:masterClrMapping/>
   </p:clrMapOvr>
-  <mc:AlternateContent xmlns:mc="http://schemas.openxmlformats.org/markup-compatibility/2006">
-    <mc:Choice xmlns:p14="http://schemas.microsoft.com/office/powerpoint/2010/main" Requires="p14">
+  <mc:AlternateContent xmlns:mc="http://schemas.openxmlformats.org/markup-compatibility/2006" xmlns:p14="http://schemas.microsoft.com/office/powerpoint/2010/main">
+    <mc:Choice Requires="p14">
       <p:transition p14:dur="0"/>
     </mc:Choice>
-    <mc:Fallback>
+    <mc:Fallback xmlns="">
       <p:transition/>
     </mc:Fallback>
   </mc:AlternateContent>
@@ -29103,11 +28881,11 @@
   <p:clrMapOvr>
     <a:masterClrMapping/>
   </p:clrMapOvr>
-  <mc:AlternateContent xmlns:mc="http://schemas.openxmlformats.org/markup-compatibility/2006">
-    <mc:Choice xmlns:p14="http://schemas.microsoft.com/office/powerpoint/2010/main" Requires="p14">
+  <mc:AlternateContent xmlns:mc="http://schemas.openxmlformats.org/markup-compatibility/2006" xmlns:p14="http://schemas.microsoft.com/office/powerpoint/2010/main">
+    <mc:Choice Requires="p14">
       <p:transition p14:dur="0"/>
     </mc:Choice>
-    <mc:Fallback>
+    <mc:Fallback xmlns="">
       <p:transition/>
     </mc:Fallback>
   </mc:AlternateContent>
@@ -29180,7 +28958,7 @@
           <a:p>
             <a:r>
               <a:rPr lang="en-US" sz="2800" dirty="0"/>
-              <a:t>Deployed models and pipelines should be monitored and furthered trained</a:t>
+              <a:t>Deployed models and pipelines should be monitored and trained further</a:t>
             </a:r>
           </a:p>
         </p:txBody>
@@ -29227,7 +29005,7 @@
         </p:nvSpPr>
         <p:spPr>
           <a:xfrm>
-            <a:off x="571462" y="4253926"/>
+            <a:off x="571462" y="4241640"/>
             <a:ext cx="10851043" cy="1064302"/>
           </a:xfrm>
           <a:prstGeom prst="rect">
@@ -29309,11 +29087,11 @@
   <p:clrMapOvr>
     <a:masterClrMapping/>
   </p:clrMapOvr>
-  <mc:AlternateContent xmlns:mc="http://schemas.openxmlformats.org/markup-compatibility/2006">
-    <mc:Choice xmlns:p14="http://schemas.microsoft.com/office/powerpoint/2010/main" Requires="p14">
+  <mc:AlternateContent xmlns:mc="http://schemas.openxmlformats.org/markup-compatibility/2006" xmlns:p14="http://schemas.microsoft.com/office/powerpoint/2010/main">
+    <mc:Choice Requires="p14">
       <p:transition p14:dur="0"/>
     </mc:Choice>
-    <mc:Fallback>
+    <mc:Fallback xmlns="">
       <p:transition/>
     </mc:Fallback>
   </mc:AlternateContent>
@@ -31921,11 +31699,11 @@
   <p:clrMapOvr>
     <a:masterClrMapping/>
   </p:clrMapOvr>
-  <mc:AlternateContent xmlns:mc="http://schemas.openxmlformats.org/markup-compatibility/2006">
-    <mc:Choice xmlns:p14="http://schemas.microsoft.com/office/powerpoint/2010/main" Requires="p14">
+  <mc:AlternateContent xmlns:mc="http://schemas.openxmlformats.org/markup-compatibility/2006" xmlns:p14="http://schemas.microsoft.com/office/powerpoint/2010/main">
+    <mc:Choice Requires="p14">
       <p:transition p14:dur="0"/>
     </mc:Choice>
-    <mc:Fallback>
+    <mc:Fallback xmlns="">
       <p:transition/>
     </mc:Fallback>
   </mc:AlternateContent>
@@ -34145,11 +33923,11 @@
   <p:clrMapOvr>
     <a:masterClrMapping/>
   </p:clrMapOvr>
-  <mc:AlternateContent xmlns:mc="http://schemas.openxmlformats.org/markup-compatibility/2006">
-    <mc:Choice xmlns:p14="http://schemas.microsoft.com/office/powerpoint/2010/main" Requires="p14">
+  <mc:AlternateContent xmlns:mc="http://schemas.openxmlformats.org/markup-compatibility/2006" xmlns:p14="http://schemas.microsoft.com/office/powerpoint/2010/main">
+    <mc:Choice Requires="p14">
       <p:transition p14:dur="0"/>
     </mc:Choice>
-    <mc:Fallback>
+    <mc:Fallback xmlns="">
       <p:transition/>
     </mc:Fallback>
   </mc:AlternateContent>
@@ -36309,11 +36087,11 @@
   <p:clrMapOvr>
     <a:masterClrMapping/>
   </p:clrMapOvr>
-  <mc:AlternateContent xmlns:mc="http://schemas.openxmlformats.org/markup-compatibility/2006">
-    <mc:Choice xmlns:p14="http://schemas.microsoft.com/office/powerpoint/2010/main" Requires="p14">
+  <mc:AlternateContent xmlns:mc="http://schemas.openxmlformats.org/markup-compatibility/2006" xmlns:p14="http://schemas.microsoft.com/office/powerpoint/2010/main">
+    <mc:Choice Requires="p14">
       <p:transition p14:dur="0"/>
     </mc:Choice>
-    <mc:Fallback>
+    <mc:Fallback xmlns="">
       <p:transition/>
     </mc:Fallback>
   </mc:AlternateContent>
@@ -38469,11 +38247,11 @@
   <p:clrMapOvr>
     <a:masterClrMapping/>
   </p:clrMapOvr>
-  <mc:AlternateContent xmlns:mc="http://schemas.openxmlformats.org/markup-compatibility/2006">
-    <mc:Choice xmlns:p14="http://schemas.microsoft.com/office/powerpoint/2010/main" Requires="p14">
+  <mc:AlternateContent xmlns:mc="http://schemas.openxmlformats.org/markup-compatibility/2006" xmlns:p14="http://schemas.microsoft.com/office/powerpoint/2010/main">
+    <mc:Choice Requires="p14">
       <p:transition p14:dur="0"/>
     </mc:Choice>
-    <mc:Fallback>
+    <mc:Fallback xmlns="">
       <p:transition/>
     </mc:Fallback>
   </mc:AlternateContent>
@@ -38629,11 +38407,11 @@
   <p:clrMapOvr>
     <a:masterClrMapping/>
   </p:clrMapOvr>
-  <mc:AlternateContent xmlns:mc="http://schemas.openxmlformats.org/markup-compatibility/2006">
-    <mc:Choice xmlns:p14="http://schemas.microsoft.com/office/powerpoint/2010/main" Requires="p14">
+  <mc:AlternateContent xmlns:mc="http://schemas.openxmlformats.org/markup-compatibility/2006" xmlns:p14="http://schemas.microsoft.com/office/powerpoint/2010/main">
+    <mc:Choice Requires="p14">
       <p:transition p14:dur="0"/>
     </mc:Choice>
-    <mc:Fallback>
+    <mc:Fallback xmlns="">
       <p:transition/>
     </mc:Fallback>
   </mc:AlternateContent>
@@ -38761,11 +38539,11 @@
   <p:clrMapOvr>
     <a:masterClrMapping/>
   </p:clrMapOvr>
-  <mc:AlternateContent xmlns:mc="http://schemas.openxmlformats.org/markup-compatibility/2006">
-    <mc:Choice xmlns:p14="http://schemas.microsoft.com/office/powerpoint/2010/main" Requires="p14">
+  <mc:AlternateContent xmlns:mc="http://schemas.openxmlformats.org/markup-compatibility/2006" xmlns:p14="http://schemas.microsoft.com/office/powerpoint/2010/main">
+    <mc:Choice Requires="p14">
       <p:transition p14:dur="0"/>
     </mc:Choice>
-    <mc:Fallback>
+    <mc:Fallback xmlns="">
       <p:transition/>
     </mc:Fallback>
   </mc:AlternateContent>
@@ -38894,11 +38672,11 @@
   <p:clrMapOvr>
     <a:masterClrMapping/>
   </p:clrMapOvr>
-  <mc:AlternateContent xmlns:mc="http://schemas.openxmlformats.org/markup-compatibility/2006">
-    <mc:Choice xmlns:p14="http://schemas.microsoft.com/office/powerpoint/2010/main" Requires="p14">
+  <mc:AlternateContent xmlns:mc="http://schemas.openxmlformats.org/markup-compatibility/2006" xmlns:p14="http://schemas.microsoft.com/office/powerpoint/2010/main">
+    <mc:Choice Requires="p14">
       <p:transition p14:dur="0"/>
     </mc:Choice>
-    <mc:Fallback>
+    <mc:Fallback xmlns="">
       <p:transition/>
     </mc:Fallback>
   </mc:AlternateContent>
@@ -39380,11 +39158,11 @@
   <p:clrMapOvr>
     <a:masterClrMapping/>
   </p:clrMapOvr>
-  <mc:AlternateContent xmlns:mc="http://schemas.openxmlformats.org/markup-compatibility/2006">
-    <mc:Choice xmlns:p14="http://schemas.microsoft.com/office/powerpoint/2010/main" Requires="p14">
+  <mc:AlternateContent xmlns:mc="http://schemas.openxmlformats.org/markup-compatibility/2006" xmlns:p14="http://schemas.microsoft.com/office/powerpoint/2010/main">
+    <mc:Choice Requires="p14">
       <p:transition p14:dur="0"/>
     </mc:Choice>
-    <mc:Fallback>
+    <mc:Fallback xmlns="">
       <p:transition/>
     </mc:Fallback>
   </mc:AlternateContent>
@@ -39868,11 +39646,11 @@
   <p:clrMapOvr>
     <a:masterClrMapping/>
   </p:clrMapOvr>
-  <mc:AlternateContent xmlns:mc="http://schemas.openxmlformats.org/markup-compatibility/2006">
-    <mc:Choice xmlns:p14="http://schemas.microsoft.com/office/powerpoint/2010/main" Requires="p14">
+  <mc:AlternateContent xmlns:mc="http://schemas.openxmlformats.org/markup-compatibility/2006" xmlns:p14="http://schemas.microsoft.com/office/powerpoint/2010/main">
+    <mc:Choice Requires="p14">
       <p:transition p14:dur="0"/>
     </mc:Choice>
-    <mc:Fallback>
+    <mc:Fallback xmlns="">
       <p:transition/>
     </mc:Fallback>
   </mc:AlternateContent>
@@ -41019,11 +40797,11 @@
   <p:clrMapOvr>
     <a:masterClrMapping/>
   </p:clrMapOvr>
-  <mc:AlternateContent xmlns:mc="http://schemas.openxmlformats.org/markup-compatibility/2006">
-    <mc:Choice xmlns:p14="http://schemas.microsoft.com/office/powerpoint/2010/main" Requires="p14">
+  <mc:AlternateContent xmlns:mc="http://schemas.openxmlformats.org/markup-compatibility/2006" xmlns:p14="http://schemas.microsoft.com/office/powerpoint/2010/main">
+    <mc:Choice Requires="p14">
       <p:transition p14:dur="0"/>
     </mc:Choice>
-    <mc:Fallback>
+    <mc:Fallback xmlns="">
       <p:transition/>
     </mc:Fallback>
   </mc:AlternateContent>
@@ -41357,11 +41135,11 @@
   <p:clrMapOvr>
     <a:masterClrMapping/>
   </p:clrMapOvr>
-  <mc:AlternateContent xmlns:mc="http://schemas.openxmlformats.org/markup-compatibility/2006">
-    <mc:Choice xmlns:p14="http://schemas.microsoft.com/office/powerpoint/2010/main" Requires="p14">
+  <mc:AlternateContent xmlns:mc="http://schemas.openxmlformats.org/markup-compatibility/2006" xmlns:p14="http://schemas.microsoft.com/office/powerpoint/2010/main">
+    <mc:Choice Requires="p14">
       <p:transition p14:dur="0"/>
     </mc:Choice>
-    <mc:Fallback>
+    <mc:Fallback xmlns="">
       <p:transition/>
     </mc:Fallback>
   </mc:AlternateContent>
@@ -42234,11 +42012,11 @@
   <p:clrMapOvr>
     <a:masterClrMapping/>
   </p:clrMapOvr>
-  <mc:AlternateContent xmlns:mc="http://schemas.openxmlformats.org/markup-compatibility/2006">
-    <mc:Choice xmlns:p14="http://schemas.microsoft.com/office/powerpoint/2010/main" Requires="p14">
+  <mc:AlternateContent xmlns:mc="http://schemas.openxmlformats.org/markup-compatibility/2006" xmlns:p14="http://schemas.microsoft.com/office/powerpoint/2010/main">
+    <mc:Choice Requires="p14">
       <p:transition p14:dur="0"/>
     </mc:Choice>
-    <mc:Fallback>
+    <mc:Fallback xmlns="">
       <p:transition/>
     </mc:Fallback>
   </mc:AlternateContent>
@@ -42365,11 +42143,11 @@
   <p:clrMapOvr>
     <a:masterClrMapping/>
   </p:clrMapOvr>
-  <mc:AlternateContent xmlns:mc="http://schemas.openxmlformats.org/markup-compatibility/2006">
-    <mc:Choice xmlns:p14="http://schemas.microsoft.com/office/powerpoint/2010/main" Requires="p14">
+  <mc:AlternateContent xmlns:mc="http://schemas.openxmlformats.org/markup-compatibility/2006" xmlns:p14="http://schemas.microsoft.com/office/powerpoint/2010/main">
+    <mc:Choice Requires="p14">
       <p:transition p14:dur="0"/>
     </mc:Choice>
-    <mc:Fallback>
+    <mc:Fallback xmlns="">
       <p:transition/>
     </mc:Fallback>
   </mc:AlternateContent>
@@ -42460,11 +42238,11 @@
   <p:clrMapOvr>
     <a:masterClrMapping/>
   </p:clrMapOvr>
-  <mc:AlternateContent xmlns:mc="http://schemas.openxmlformats.org/markup-compatibility/2006">
-    <mc:Choice xmlns:p14="http://schemas.microsoft.com/office/powerpoint/2010/main" Requires="p14">
+  <mc:AlternateContent xmlns:mc="http://schemas.openxmlformats.org/markup-compatibility/2006" xmlns:p14="http://schemas.microsoft.com/office/powerpoint/2010/main">
+    <mc:Choice Requires="p14">
       <p:transition p14:dur="0"/>
     </mc:Choice>
-    <mc:Fallback>
+    <mc:Fallback xmlns="">
       <p:transition/>
     </mc:Fallback>
   </mc:AlternateContent>
@@ -42585,11 +42363,11 @@
   <p:clrMapOvr>
     <a:masterClrMapping/>
   </p:clrMapOvr>
-  <mc:AlternateContent xmlns:mc="http://schemas.openxmlformats.org/markup-compatibility/2006">
-    <mc:Choice xmlns:p14="http://schemas.microsoft.com/office/powerpoint/2010/main" Requires="p14">
+  <mc:AlternateContent xmlns:mc="http://schemas.openxmlformats.org/markup-compatibility/2006" xmlns:p14="http://schemas.microsoft.com/office/powerpoint/2010/main">
+    <mc:Choice Requires="p14">
       <p:transition p14:dur="0"/>
     </mc:Choice>
-    <mc:Fallback>
+    <mc:Fallback xmlns="">
       <p:transition/>
     </mc:Fallback>
   </mc:AlternateContent>
@@ -43502,7 +43280,7 @@
           <a:p>
             <a:r>
               <a:rPr lang="en-US" sz="2400" b="1" dirty="0"/>
-              <a:t>5. Retraining</a:t>
+              <a:t>6. Retraining</a:t>
             </a:r>
           </a:p>
         </p:txBody>
@@ -44018,11 +43796,11 @@
   <p:clrMapOvr>
     <a:masterClrMapping/>
   </p:clrMapOvr>
-  <mc:AlternateContent xmlns:mc="http://schemas.openxmlformats.org/markup-compatibility/2006">
-    <mc:Choice xmlns:p14="http://schemas.microsoft.com/office/powerpoint/2010/main" Requires="p14">
+  <mc:AlternateContent xmlns:mc="http://schemas.openxmlformats.org/markup-compatibility/2006" xmlns:p14="http://schemas.microsoft.com/office/powerpoint/2010/main">
+    <mc:Choice Requires="p14">
       <p:transition p14:dur="0"/>
     </mc:Choice>
-    <mc:Fallback>
+    <mc:Fallback xmlns="">
       <p:transition/>
     </mc:Fallback>
   </mc:AlternateContent>
@@ -44488,8 +44266,8 @@
         </p:nvSpPr>
         <p:spPr>
           <a:xfrm>
-            <a:off x="0" y="2965520"/>
-            <a:ext cx="12192000" cy="1200329"/>
+            <a:off x="191729" y="2965520"/>
+            <a:ext cx="11842956" cy="1200329"/>
           </a:xfrm>
           <a:prstGeom prst="rect">
             <a:avLst/>
@@ -44519,7 +44297,7 @@
             <a:pPr algn="ctr"/>
             <a:r>
               <a:rPr lang="en-US" sz="3600" dirty="0"/>
-              <a:t>Can we provide the same level of </a:t>
+              <a:t>Can a platform provide the same level of </a:t>
             </a:r>
             <a:r>
               <a:rPr lang="en-US" sz="3600" b="1" dirty="0"/>
@@ -44550,11 +44328,11 @@
   <p:clrMapOvr>
     <a:masterClrMapping/>
   </p:clrMapOvr>
-  <mc:AlternateContent xmlns:mc="http://schemas.openxmlformats.org/markup-compatibility/2006">
-    <mc:Choice xmlns:p14="http://schemas.microsoft.com/office/powerpoint/2010/main" Requires="p14">
+  <mc:AlternateContent xmlns:mc="http://schemas.openxmlformats.org/markup-compatibility/2006" xmlns:p14="http://schemas.microsoft.com/office/powerpoint/2010/main">
+    <mc:Choice Requires="p14">
       <p:transition p14:dur="0"/>
     </mc:Choice>
-    <mc:Fallback>
+    <mc:Fallback xmlns="">
       <p:transition/>
     </mc:Fallback>
   </mc:AlternateContent>
@@ -44956,8 +44734,8 @@
         </p:nvSpPr>
         <p:spPr>
           <a:xfrm>
-            <a:off x="2335298" y="4703009"/>
-            <a:ext cx="7544245" cy="1569660"/>
+            <a:off x="2335298" y="4434454"/>
+            <a:ext cx="7544245" cy="2062103"/>
           </a:xfrm>
           <a:prstGeom prst="rect">
             <a:avLst/>
@@ -44969,6 +44747,19 @@
             <a:spAutoFit/>
           </a:bodyPr>
           <a:lstStyle/>
+          <a:p>
+            <a:pPr marL="285750" indent="-285750">
+              <a:buClr>
+                <a:schemeClr val="tx1"/>
+              </a:buClr>
+              <a:buFont typeface="Arial" panose="020B0604020202020204" pitchFamily="34" charset="0"/>
+              <a:buChar char="•"/>
+            </a:pPr>
+            <a:r>
+              <a:rPr lang="en-US" sz="3200" dirty="0"/>
+              <a:t>Train the model inside the platform</a:t>
+            </a:r>
+          </a:p>
           <a:p>
             <a:pPr marL="285750" indent="-285750">
               <a:buClr>
@@ -45506,304 +45297,14 @@
   <p:clrMapOvr>
     <a:masterClrMapping/>
   </p:clrMapOvr>
-  <mc:AlternateContent xmlns:mc="http://schemas.openxmlformats.org/markup-compatibility/2006">
-    <mc:Choice xmlns:p14="http://schemas.microsoft.com/office/powerpoint/2010/main" Requires="p14">
+  <mc:AlternateContent xmlns:mc="http://schemas.openxmlformats.org/markup-compatibility/2006" xmlns:p14="http://schemas.microsoft.com/office/powerpoint/2010/main">
+    <mc:Choice Requires="p14">
       <p:transition p14:dur="0"/>
     </mc:Choice>
-    <mc:Fallback>
+    <mc:Fallback xmlns="">
       <p:transition/>
     </mc:Fallback>
   </mc:AlternateContent>
-  <p:timing>
-    <p:tnLst>
-      <p:par>
-        <p:cTn id="1" dur="indefinite" restart="never" nodeType="tmRoot">
-          <p:childTnLst>
-            <p:seq concurrent="1" nextAc="seek">
-              <p:cTn id="2" dur="indefinite" nodeType="mainSeq">
-                <p:childTnLst>
-                  <p:par>
-                    <p:cTn id="3" fill="hold">
-                      <p:stCondLst>
-                        <p:cond delay="indefinite"/>
-                      </p:stCondLst>
-                      <p:childTnLst>
-                        <p:par>
-                          <p:cTn id="4" fill="hold">
-                            <p:stCondLst>
-                              <p:cond delay="0"/>
-                            </p:stCondLst>
-                            <p:childTnLst>
-                              <p:par>
-                                <p:cTn id="5" presetID="1" presetClass="entr" presetSubtype="0" fill="hold" nodeType="clickEffect">
-                                  <p:stCondLst>
-                                    <p:cond delay="0"/>
-                                  </p:stCondLst>
-                                  <p:childTnLst>
-                                    <p:set>
-                                      <p:cBhvr>
-                                        <p:cTn id="6" dur="1" fill="hold">
-                                          <p:stCondLst>
-                                            <p:cond delay="0"/>
-                                          </p:stCondLst>
-                                        </p:cTn>
-                                        <p:tgtEl>
-                                          <p:spTgt spid="20">
-                                            <p:txEl>
-                                              <p:pRg st="0" end="0"/>
-                                            </p:txEl>
-                                          </p:spTgt>
-                                        </p:tgtEl>
-                                        <p:attrNameLst>
-                                          <p:attrName>style.visibility</p:attrName>
-                                        </p:attrNameLst>
-                                      </p:cBhvr>
-                                      <p:to>
-                                        <p:strVal val="visible"/>
-                                      </p:to>
-                                    </p:set>
-                                  </p:childTnLst>
-                                </p:cTn>
-                              </p:par>
-                              <p:par>
-                                <p:cTn id="7" presetID="1" presetClass="entr" presetSubtype="0" fill="hold" nodeType="withEffect">
-                                  <p:stCondLst>
-                                    <p:cond delay="0"/>
-                                  </p:stCondLst>
-                                  <p:childTnLst>
-                                    <p:set>
-                                      <p:cBhvr>
-                                        <p:cTn id="8" dur="1" fill="hold">
-                                          <p:stCondLst>
-                                            <p:cond delay="0"/>
-                                          </p:stCondLst>
-                                        </p:cTn>
-                                        <p:tgtEl>
-                                          <p:spTgt spid="6"/>
-                                        </p:tgtEl>
-                                        <p:attrNameLst>
-                                          <p:attrName>style.visibility</p:attrName>
-                                        </p:attrNameLst>
-                                      </p:cBhvr>
-                                      <p:to>
-                                        <p:strVal val="visible"/>
-                                      </p:to>
-                                    </p:set>
-                                  </p:childTnLst>
-                                </p:cTn>
-                              </p:par>
-                              <p:par>
-                                <p:cTn id="9" presetID="1" presetClass="entr" presetSubtype="0" fill="hold" grpId="0" nodeType="withEffect">
-                                  <p:stCondLst>
-                                    <p:cond delay="0"/>
-                                  </p:stCondLst>
-                                  <p:childTnLst>
-                                    <p:set>
-                                      <p:cBhvr>
-                                        <p:cTn id="10" dur="1" fill="hold">
-                                          <p:stCondLst>
-                                            <p:cond delay="0"/>
-                                          </p:stCondLst>
-                                        </p:cTn>
-                                        <p:tgtEl>
-                                          <p:spTgt spid="13"/>
-                                        </p:tgtEl>
-                                        <p:attrNameLst>
-                                          <p:attrName>style.visibility</p:attrName>
-                                        </p:attrNameLst>
-                                      </p:cBhvr>
-                                      <p:to>
-                                        <p:strVal val="visible"/>
-                                      </p:to>
-                                    </p:set>
-                                  </p:childTnLst>
-                                </p:cTn>
-                              </p:par>
-                            </p:childTnLst>
-                          </p:cTn>
-                        </p:par>
-                      </p:childTnLst>
-                    </p:cTn>
-                  </p:par>
-                  <p:par>
-                    <p:cTn id="11" fill="hold">
-                      <p:stCondLst>
-                        <p:cond delay="indefinite"/>
-                      </p:stCondLst>
-                      <p:childTnLst>
-                        <p:par>
-                          <p:cTn id="12" fill="hold">
-                            <p:stCondLst>
-                              <p:cond delay="0"/>
-                            </p:stCondLst>
-                            <p:childTnLst>
-                              <p:par>
-                                <p:cTn id="13" presetID="1" presetClass="entr" presetSubtype="0" fill="hold" nodeType="clickEffect">
-                                  <p:stCondLst>
-                                    <p:cond delay="0"/>
-                                  </p:stCondLst>
-                                  <p:childTnLst>
-                                    <p:set>
-                                      <p:cBhvr>
-                                        <p:cTn id="14" dur="1" fill="hold">
-                                          <p:stCondLst>
-                                            <p:cond delay="0"/>
-                                          </p:stCondLst>
-                                        </p:cTn>
-                                        <p:tgtEl>
-                                          <p:spTgt spid="20">
-                                            <p:txEl>
-                                              <p:pRg st="1" end="1"/>
-                                            </p:txEl>
-                                          </p:spTgt>
-                                        </p:tgtEl>
-                                        <p:attrNameLst>
-                                          <p:attrName>style.visibility</p:attrName>
-                                        </p:attrNameLst>
-                                      </p:cBhvr>
-                                      <p:to>
-                                        <p:strVal val="visible"/>
-                                      </p:to>
-                                    </p:set>
-                                  </p:childTnLst>
-                                </p:cTn>
-                              </p:par>
-                              <p:par>
-                                <p:cTn id="15" presetID="1" presetClass="entr" presetSubtype="0" fill="hold" grpId="0" nodeType="withEffect">
-                                  <p:stCondLst>
-                                    <p:cond delay="0"/>
-                                  </p:stCondLst>
-                                  <p:childTnLst>
-                                    <p:set>
-                                      <p:cBhvr>
-                                        <p:cTn id="16" dur="1" fill="hold">
-                                          <p:stCondLst>
-                                            <p:cond delay="0"/>
-                                          </p:stCondLst>
-                                        </p:cTn>
-                                        <p:tgtEl>
-                                          <p:spTgt spid="29"/>
-                                        </p:tgtEl>
-                                        <p:attrNameLst>
-                                          <p:attrName>style.visibility</p:attrName>
-                                        </p:attrNameLst>
-                                      </p:cBhvr>
-                                      <p:to>
-                                        <p:strVal val="visible"/>
-                                      </p:to>
-                                    </p:set>
-                                  </p:childTnLst>
-                                </p:cTn>
-                              </p:par>
-                            </p:childTnLst>
-                          </p:cTn>
-                        </p:par>
-                      </p:childTnLst>
-                    </p:cTn>
-                  </p:par>
-                  <p:par>
-                    <p:cTn id="17" fill="hold">
-                      <p:stCondLst>
-                        <p:cond delay="indefinite"/>
-                      </p:stCondLst>
-                      <p:childTnLst>
-                        <p:par>
-                          <p:cTn id="18" fill="hold">
-                            <p:stCondLst>
-                              <p:cond delay="0"/>
-                            </p:stCondLst>
-                            <p:childTnLst>
-                              <p:par>
-                                <p:cTn id="19" presetID="1" presetClass="entr" presetSubtype="0" fill="hold" nodeType="clickEffect">
-                                  <p:stCondLst>
-                                    <p:cond delay="0"/>
-                                  </p:stCondLst>
-                                  <p:childTnLst>
-                                    <p:set>
-                                      <p:cBhvr>
-                                        <p:cTn id="20" dur="1" fill="hold">
-                                          <p:stCondLst>
-                                            <p:cond delay="0"/>
-                                          </p:stCondLst>
-                                        </p:cTn>
-                                        <p:tgtEl>
-                                          <p:spTgt spid="20">
-                                            <p:txEl>
-                                              <p:pRg st="2" end="2"/>
-                                            </p:txEl>
-                                          </p:spTgt>
-                                        </p:tgtEl>
-                                        <p:attrNameLst>
-                                          <p:attrName>style.visibility</p:attrName>
-                                        </p:attrNameLst>
-                                      </p:cBhvr>
-                                      <p:to>
-                                        <p:strVal val="visible"/>
-                                      </p:to>
-                                    </p:set>
-                                  </p:childTnLst>
-                                </p:cTn>
-                              </p:par>
-                              <p:par>
-                                <p:cTn id="21" presetID="1" presetClass="entr" presetSubtype="0" fill="hold" grpId="0" nodeType="withEffect">
-                                  <p:stCondLst>
-                                    <p:cond delay="0"/>
-                                  </p:stCondLst>
-                                  <p:childTnLst>
-                                    <p:set>
-                                      <p:cBhvr>
-                                        <p:cTn id="22" dur="1" fill="hold">
-                                          <p:stCondLst>
-                                            <p:cond delay="0"/>
-                                          </p:stCondLst>
-                                        </p:cTn>
-                                        <p:tgtEl>
-                                          <p:spTgt spid="25"/>
-                                        </p:tgtEl>
-                                        <p:attrNameLst>
-                                          <p:attrName>style.visibility</p:attrName>
-                                        </p:attrNameLst>
-                                      </p:cBhvr>
-                                      <p:to>
-                                        <p:strVal val="visible"/>
-                                      </p:to>
-                                    </p:set>
-                                  </p:childTnLst>
-                                </p:cTn>
-                              </p:par>
-                            </p:childTnLst>
-                          </p:cTn>
-                        </p:par>
-                      </p:childTnLst>
-                    </p:cTn>
-                  </p:par>
-                </p:childTnLst>
-              </p:cTn>
-              <p:prevCondLst>
-                <p:cond evt="onPrev" delay="0">
-                  <p:tgtEl>
-                    <p:sldTgt/>
-                  </p:tgtEl>
-                </p:cond>
-              </p:prevCondLst>
-              <p:nextCondLst>
-                <p:cond evt="onNext" delay="0">
-                  <p:tgtEl>
-                    <p:sldTgt/>
-                  </p:tgtEl>
-                </p:cond>
-              </p:nextCondLst>
-            </p:seq>
-          </p:childTnLst>
-        </p:cTn>
-      </p:par>
-    </p:tnLst>
-    <p:bldLst>
-      <p:bldP spid="25" grpId="0" animBg="1"/>
-      <p:bldP spid="13" grpId="0"/>
-      <p:bldP spid="29" grpId="0" animBg="1"/>
-    </p:bldLst>
-  </p:timing>
 </p:sld>
 </file>
 
@@ -47563,11 +47064,11 @@
   <p:clrMapOvr>
     <a:masterClrMapping/>
   </p:clrMapOvr>
-  <mc:AlternateContent xmlns:mc="http://schemas.openxmlformats.org/markup-compatibility/2006">
-    <mc:Choice xmlns:p14="http://schemas.microsoft.com/office/powerpoint/2010/main" Requires="p14">
+  <mc:AlternateContent xmlns:mc="http://schemas.openxmlformats.org/markup-compatibility/2006" xmlns:p14="http://schemas.microsoft.com/office/powerpoint/2010/main">
+    <mc:Choice Requires="p14">
       <p:transition p14:dur="0"/>
     </mc:Choice>
-    <mc:Fallback>
+    <mc:Fallback xmlns="">
       <p:transition/>
     </mc:Fallback>
   </mc:AlternateContent>
@@ -49481,11 +48982,11 @@
   <p:clrMapOvr>
     <a:masterClrMapping/>
   </p:clrMapOvr>
-  <mc:AlternateContent xmlns:mc="http://schemas.openxmlformats.org/markup-compatibility/2006">
-    <mc:Choice xmlns:p14="http://schemas.microsoft.com/office/powerpoint/2010/main" Requires="p14">
+  <mc:AlternateContent xmlns:mc="http://schemas.openxmlformats.org/markup-compatibility/2006" xmlns:p14="http://schemas.microsoft.com/office/powerpoint/2010/main">
+    <mc:Choice Requires="p14">
       <p:transition p14:dur="0"/>
     </mc:Choice>
-    <mc:Fallback>
+    <mc:Fallback xmlns="">
       <p:transition/>
     </mc:Fallback>
   </mc:AlternateContent>
@@ -51487,11 +50988,11 @@
   <p:clrMapOvr>
     <a:masterClrMapping/>
   </p:clrMapOvr>
-  <mc:AlternateContent xmlns:mc="http://schemas.openxmlformats.org/markup-compatibility/2006">
-    <mc:Choice xmlns:p14="http://schemas.microsoft.com/office/powerpoint/2010/main" Requires="p14">
+  <mc:AlternateContent xmlns:mc="http://schemas.openxmlformats.org/markup-compatibility/2006" xmlns:p14="http://schemas.microsoft.com/office/powerpoint/2010/main">
+    <mc:Choice Requires="p14">
       <p:transition p14:dur="0"/>
     </mc:Choice>
-    <mc:Fallback>
+    <mc:Fallback xmlns="">
       <p:transition/>
     </mc:Fallback>
   </mc:AlternateContent>

</xml_diff>